<commit_message>
chore: edit powerpoint presentation
</commit_message>
<xml_diff>
--- a/Nutrien.pptx
+++ b/Nutrien.pptx
@@ -15,7 +15,8 @@
     <p:sldId id="259" r:id="rId9"/>
     <p:sldId id="264" r:id="rId10"/>
     <p:sldId id="265" r:id="rId11"/>
-    <p:sldId id="266" r:id="rId12"/>
+    <p:sldId id="267" r:id="rId12"/>
+    <p:sldId id="266" r:id="rId13"/>
   </p:sldIdLst>
   <p:sldSz cx="12192000" cy="6858000"/>
   <p:notesSz cx="6858000" cy="9144000"/>
@@ -3715,8 +3716,39 @@
               <a:rPr lang="en-US" sz="2400" dirty="0">
                 <a:latin typeface="Aileron SemiBold" panose="00000700000000000000" pitchFamily="50" charset="0"/>
               </a:rPr>
-              <a:t>"By analyzing the data and uncovering trends and patterns, we can </a:t>
-            </a:r>
+              <a:t>"By analyzing the data and uncovering trends and patterns, we can identify key areas of concern, enabling us to take targeted actions to mitigate risks and enhance workplace safety."</a:t>
+            </a:r>
+          </a:p>
+        </p:txBody>
+      </p:sp>
+      <p:sp>
+        <p:nvSpPr>
+          <p:cNvPr id="7" name="TextBox 6">
+            <a:extLst>
+              <a:ext uri="{FF2B5EF4-FFF2-40B4-BE49-F238E27FC236}">
+                <a16:creationId xmlns:a16="http://schemas.microsoft.com/office/drawing/2014/main" id="{09D89340-9C33-463D-A324-265C055161A7}"/>
+              </a:ext>
+            </a:extLst>
+          </p:cNvPr>
+          <p:cNvSpPr txBox="1"/>
+          <p:nvPr/>
+        </p:nvSpPr>
+        <p:spPr>
+          <a:xfrm>
+            <a:off x="2308860" y="3424516"/>
+            <a:ext cx="4229100" cy="461665"/>
+          </a:xfrm>
+          <a:prstGeom prst="rect">
+            <a:avLst/>
+          </a:prstGeom>
+          <a:noFill/>
+        </p:spPr>
+        <p:txBody>
+          <a:bodyPr wrap="square">
+            <a:spAutoFit/>
+          </a:bodyPr>
+          <a:lstStyle/>
+          <a:p>
             <a:r>
               <a:rPr lang="en-US" sz="2400" u="sng" dirty="0">
                 <a:solidFill>
@@ -3726,12 +3758,42 @@
               </a:rPr>
               <a:t>identify key areas of concern</a:t>
             </a:r>
-            <a:r>
-              <a:rPr lang="en-US" sz="2400" dirty="0">
-                <a:latin typeface="Aileron SemiBold" panose="00000700000000000000" pitchFamily="50" charset="0"/>
-              </a:rPr>
-              <a:t>, enabling us to take targeted actions to </a:t>
-            </a:r>
+            <a:endParaRPr lang="en-US" sz="2400" u="sng" dirty="0">
+              <a:solidFill>
+                <a:srgbClr val="FF0000"/>
+              </a:solidFill>
+            </a:endParaRPr>
+          </a:p>
+        </p:txBody>
+      </p:sp>
+      <p:sp>
+        <p:nvSpPr>
+          <p:cNvPr id="9" name="TextBox 8">
+            <a:extLst>
+              <a:ext uri="{FF2B5EF4-FFF2-40B4-BE49-F238E27FC236}">
+                <a16:creationId xmlns:a16="http://schemas.microsoft.com/office/drawing/2014/main" id="{38AB67C6-878F-49A7-924D-9F791BB87585}"/>
+              </a:ext>
+            </a:extLst>
+          </p:cNvPr>
+          <p:cNvSpPr txBox="1"/>
+          <p:nvPr/>
+        </p:nvSpPr>
+        <p:spPr>
+          <a:xfrm>
+            <a:off x="3154680" y="3786229"/>
+            <a:ext cx="2214880" cy="461665"/>
+          </a:xfrm>
+          <a:prstGeom prst="rect">
+            <a:avLst/>
+          </a:prstGeom>
+          <a:noFill/>
+        </p:spPr>
+        <p:txBody>
+          <a:bodyPr wrap="square">
+            <a:spAutoFit/>
+          </a:bodyPr>
+          <a:lstStyle/>
+          <a:p>
             <a:r>
               <a:rPr lang="en-US" sz="2400" u="sng" dirty="0">
                 <a:solidFill>
@@ -3741,12 +3803,42 @@
               </a:rPr>
               <a:t>mitigate risks </a:t>
             </a:r>
-            <a:r>
-              <a:rPr lang="en-US" sz="2400" dirty="0">
-                <a:latin typeface="Aileron SemiBold" panose="00000700000000000000" pitchFamily="50" charset="0"/>
-              </a:rPr>
-              <a:t>and </a:t>
-            </a:r>
+            <a:endParaRPr lang="en-US" sz="2400" u="sng" dirty="0">
+              <a:solidFill>
+                <a:srgbClr val="FF0000"/>
+              </a:solidFill>
+            </a:endParaRPr>
+          </a:p>
+        </p:txBody>
+      </p:sp>
+      <p:sp>
+        <p:nvSpPr>
+          <p:cNvPr id="11" name="TextBox 10">
+            <a:extLst>
+              <a:ext uri="{FF2B5EF4-FFF2-40B4-BE49-F238E27FC236}">
+                <a16:creationId xmlns:a16="http://schemas.microsoft.com/office/drawing/2014/main" id="{A7E0BA7E-746C-478D-8E07-6D55BC3EC1E5}"/>
+              </a:ext>
+            </a:extLst>
+          </p:cNvPr>
+          <p:cNvSpPr txBox="1"/>
+          <p:nvPr/>
+        </p:nvSpPr>
+        <p:spPr>
+          <a:xfrm>
+            <a:off x="5678170" y="3791418"/>
+            <a:ext cx="3901440" cy="461665"/>
+          </a:xfrm>
+          <a:prstGeom prst="rect">
+            <a:avLst/>
+          </a:prstGeom>
+          <a:noFill/>
+        </p:spPr>
+        <p:txBody>
+          <a:bodyPr wrap="square">
+            <a:spAutoFit/>
+          </a:bodyPr>
+          <a:lstStyle/>
+          <a:p>
             <a:r>
               <a:rPr lang="en-US" sz="2400" u="sng" dirty="0">
                 <a:solidFill>
@@ -3756,12 +3848,11 @@
               </a:rPr>
               <a:t>enhance workplace safety</a:t>
             </a:r>
-            <a:r>
-              <a:rPr lang="en-US" sz="2400" dirty="0">
-                <a:latin typeface="Aileron SemiBold" panose="00000700000000000000" pitchFamily="50" charset="0"/>
-              </a:rPr>
-              <a:t>."</a:t>
-            </a:r>
+            <a:endParaRPr lang="en-US" sz="2400" u="sng" dirty="0">
+              <a:solidFill>
+                <a:srgbClr val="FF0000"/>
+              </a:solidFill>
+            </a:endParaRPr>
           </a:p>
         </p:txBody>
       </p:sp>
@@ -3775,6 +3866,259 @@
   <p:clrMapOvr>
     <a:masterClrMapping/>
   </p:clrMapOvr>
+  <p:timing>
+    <p:tnLst>
+      <p:par>
+        <p:cTn id="1" dur="indefinite" restart="never" nodeType="tmRoot">
+          <p:childTnLst>
+            <p:seq concurrent="1" nextAc="seek">
+              <p:cTn id="2" dur="indefinite" nodeType="mainSeq">
+                <p:childTnLst>
+                  <p:par>
+                    <p:cTn id="3" fill="hold">
+                      <p:stCondLst>
+                        <p:cond delay="indefinite"/>
+                      </p:stCondLst>
+                      <p:childTnLst>
+                        <p:par>
+                          <p:cTn id="4" fill="hold">
+                            <p:stCondLst>
+                              <p:cond delay="0"/>
+                            </p:stCondLst>
+                            <p:childTnLst>
+                              <p:par>
+                                <p:cTn id="5" presetID="1" presetClass="entr" presetSubtype="0" fill="hold" grpId="0" nodeType="clickEffect">
+                                  <p:stCondLst>
+                                    <p:cond delay="0"/>
+                                  </p:stCondLst>
+                                  <p:childTnLst>
+                                    <p:set>
+                                      <p:cBhvr>
+                                        <p:cTn id="6" dur="1" fill="hold">
+                                          <p:stCondLst>
+                                            <p:cond delay="0"/>
+                                          </p:stCondLst>
+                                        </p:cTn>
+                                        <p:tgtEl>
+                                          <p:spTgt spid="2"/>
+                                        </p:tgtEl>
+                                        <p:attrNameLst>
+                                          <p:attrName>style.visibility</p:attrName>
+                                        </p:attrNameLst>
+                                      </p:cBhvr>
+                                      <p:to>
+                                        <p:strVal val="visible"/>
+                                      </p:to>
+                                    </p:set>
+                                  </p:childTnLst>
+                                </p:cTn>
+                              </p:par>
+                              <p:par>
+                                <p:cTn id="7" presetID="1" presetClass="entr" presetSubtype="0" fill="hold" grpId="0" nodeType="withEffect">
+                                  <p:stCondLst>
+                                    <p:cond delay="0"/>
+                                  </p:stCondLst>
+                                  <p:childTnLst>
+                                    <p:set>
+                                      <p:cBhvr>
+                                        <p:cTn id="8" dur="1" fill="hold">
+                                          <p:stCondLst>
+                                            <p:cond delay="0"/>
+                                          </p:stCondLst>
+                                        </p:cTn>
+                                        <p:tgtEl>
+                                          <p:spTgt spid="6"/>
+                                        </p:tgtEl>
+                                        <p:attrNameLst>
+                                          <p:attrName>style.visibility</p:attrName>
+                                        </p:attrNameLst>
+                                      </p:cBhvr>
+                                      <p:to>
+                                        <p:strVal val="visible"/>
+                                      </p:to>
+                                    </p:set>
+                                  </p:childTnLst>
+                                </p:cTn>
+                              </p:par>
+                            </p:childTnLst>
+                          </p:cTn>
+                        </p:par>
+                      </p:childTnLst>
+                    </p:cTn>
+                  </p:par>
+                  <p:par>
+                    <p:cTn id="9" fill="hold">
+                      <p:stCondLst>
+                        <p:cond delay="indefinite"/>
+                      </p:stCondLst>
+                      <p:childTnLst>
+                        <p:par>
+                          <p:cTn id="10" fill="hold">
+                            <p:stCondLst>
+                              <p:cond delay="0"/>
+                            </p:stCondLst>
+                            <p:childTnLst>
+                              <p:par>
+                                <p:cTn id="11" presetID="1" presetClass="entr" presetSubtype="0" fill="hold" nodeType="clickEffect">
+                                  <p:stCondLst>
+                                    <p:cond delay="0"/>
+                                  </p:stCondLst>
+                                  <p:childTnLst>
+                                    <p:set>
+                                      <p:cBhvr>
+                                        <p:cTn id="12" dur="1" fill="hold">
+                                          <p:stCondLst>
+                                            <p:cond delay="0"/>
+                                          </p:stCondLst>
+                                        </p:cTn>
+                                        <p:tgtEl>
+                                          <p:spTgt spid="7">
+                                            <p:txEl>
+                                              <p:pRg st="0" end="0"/>
+                                            </p:txEl>
+                                          </p:spTgt>
+                                        </p:tgtEl>
+                                        <p:attrNameLst>
+                                          <p:attrName>style.visibility</p:attrName>
+                                        </p:attrNameLst>
+                                      </p:cBhvr>
+                                      <p:to>
+                                        <p:strVal val="visible"/>
+                                      </p:to>
+                                    </p:set>
+                                  </p:childTnLst>
+                                </p:cTn>
+                              </p:par>
+                            </p:childTnLst>
+                          </p:cTn>
+                        </p:par>
+                      </p:childTnLst>
+                    </p:cTn>
+                  </p:par>
+                  <p:par>
+                    <p:cTn id="13" fill="hold">
+                      <p:stCondLst>
+                        <p:cond delay="indefinite"/>
+                      </p:stCondLst>
+                      <p:childTnLst>
+                        <p:par>
+                          <p:cTn id="14" fill="hold">
+                            <p:stCondLst>
+                              <p:cond delay="0"/>
+                            </p:stCondLst>
+                            <p:childTnLst>
+                              <p:par>
+                                <p:cTn id="15" presetID="1" presetClass="entr" presetSubtype="0" fill="hold" nodeType="clickEffect">
+                                  <p:stCondLst>
+                                    <p:cond delay="0"/>
+                                  </p:stCondLst>
+                                  <p:childTnLst>
+                                    <p:set>
+                                      <p:cBhvr>
+                                        <p:cTn id="16" dur="1" fill="hold">
+                                          <p:stCondLst>
+                                            <p:cond delay="0"/>
+                                          </p:stCondLst>
+                                        </p:cTn>
+                                        <p:tgtEl>
+                                          <p:spTgt spid="9">
+                                            <p:txEl>
+                                              <p:pRg st="0" end="0"/>
+                                            </p:txEl>
+                                          </p:spTgt>
+                                        </p:tgtEl>
+                                        <p:attrNameLst>
+                                          <p:attrName>style.visibility</p:attrName>
+                                        </p:attrNameLst>
+                                      </p:cBhvr>
+                                      <p:to>
+                                        <p:strVal val="visible"/>
+                                      </p:to>
+                                    </p:set>
+                                  </p:childTnLst>
+                                </p:cTn>
+                              </p:par>
+                            </p:childTnLst>
+                          </p:cTn>
+                        </p:par>
+                      </p:childTnLst>
+                    </p:cTn>
+                  </p:par>
+                  <p:par>
+                    <p:cTn id="17" fill="hold">
+                      <p:stCondLst>
+                        <p:cond delay="indefinite"/>
+                      </p:stCondLst>
+                      <p:childTnLst>
+                        <p:par>
+                          <p:cTn id="18" fill="hold">
+                            <p:stCondLst>
+                              <p:cond delay="0"/>
+                            </p:stCondLst>
+                            <p:childTnLst>
+                              <p:par>
+                                <p:cTn id="19" presetID="1" presetClass="entr" presetSubtype="0" fill="hold" nodeType="clickEffect">
+                                  <p:stCondLst>
+                                    <p:cond delay="0"/>
+                                  </p:stCondLst>
+                                  <p:childTnLst>
+                                    <p:set>
+                                      <p:cBhvr>
+                                        <p:cTn id="20" dur="1" fill="hold">
+                                          <p:stCondLst>
+                                            <p:cond delay="0"/>
+                                          </p:stCondLst>
+                                        </p:cTn>
+                                        <p:tgtEl>
+                                          <p:spTgt spid="11">
+                                            <p:txEl>
+                                              <p:pRg st="0" end="0"/>
+                                            </p:txEl>
+                                          </p:spTgt>
+                                        </p:tgtEl>
+                                        <p:attrNameLst>
+                                          <p:attrName>style.visibility</p:attrName>
+                                        </p:attrNameLst>
+                                      </p:cBhvr>
+                                      <p:to>
+                                        <p:strVal val="visible"/>
+                                      </p:to>
+                                    </p:set>
+                                  </p:childTnLst>
+                                </p:cTn>
+                              </p:par>
+                            </p:childTnLst>
+                          </p:cTn>
+                        </p:par>
+                      </p:childTnLst>
+                    </p:cTn>
+                  </p:par>
+                </p:childTnLst>
+              </p:cTn>
+              <p:prevCondLst>
+                <p:cond evt="onPrev" delay="0">
+                  <p:tgtEl>
+                    <p:sldTgt/>
+                  </p:tgtEl>
+                </p:cond>
+              </p:prevCondLst>
+              <p:nextCondLst>
+                <p:cond evt="onNext" delay="0">
+                  <p:tgtEl>
+                    <p:sldTgt/>
+                  </p:tgtEl>
+                </p:cond>
+              </p:nextCondLst>
+            </p:seq>
+          </p:childTnLst>
+        </p:cTn>
+      </p:par>
+    </p:tnLst>
+    <p:bldLst>
+      <p:bldP spid="6" grpId="0" animBg="1"/>
+      <p:bldP spid="2" grpId="0"/>
+    </p:bldLst>
+  </p:timing>
 </p:sld>
 </file>
 
@@ -3795,12 +4139,102 @@
           <a:chExt cx="0" cy="0"/>
         </a:xfrm>
       </p:grpSpPr>
-      <p:sp>
-        <p:nvSpPr>
-          <p:cNvPr id="4" name="TextBox 3">
-            <a:extLst>
-              <a:ext uri="{FF2B5EF4-FFF2-40B4-BE49-F238E27FC236}">
-                <a16:creationId xmlns:a16="http://schemas.microsoft.com/office/drawing/2014/main" id="{343EADB8-90C4-42F5-A1F4-794E8605A3BF}"/>
+      <p:pic>
+        <p:nvPicPr>
+          <p:cNvPr id="3" name="Picture 3">
+            <a:extLst>
+              <a:ext uri="{FF2B5EF4-FFF2-40B4-BE49-F238E27FC236}">
+                <a16:creationId xmlns:a16="http://schemas.microsoft.com/office/drawing/2014/main" id="{14FD71B4-6398-49B4-A1AC-F8FF3D1C014D}"/>
+              </a:ext>
+            </a:extLst>
+          </p:cNvPr>
+          <p:cNvPicPr>
+            <a:picLocks noChangeAspect="1" noChangeArrowheads="1"/>
+          </p:cNvPicPr>
+          <p:nvPr/>
+        </p:nvPicPr>
+        <p:blipFill rotWithShape="1">
+          <a:blip r:embed="rId2">
+            <a:extLst>
+              <a:ext uri="{28A0092B-C50C-407E-A947-70E740481C1C}">
+                <a14:useLocalDpi xmlns:a14="http://schemas.microsoft.com/office/drawing/2010/main" val="0"/>
+              </a:ext>
+            </a:extLst>
+          </a:blip>
+          <a:srcRect l="87629" t="48356" r="1790" b="12716"/>
+          <a:stretch/>
+        </p:blipFill>
+        <p:spPr bwMode="auto">
+          <a:xfrm rot="13500000">
+            <a:off x="10250021" y="3733705"/>
+            <a:ext cx="2289586" cy="4768515"/>
+          </a:xfrm>
+          <a:prstGeom prst="rect">
+            <a:avLst/>
+          </a:prstGeom>
+          <a:noFill/>
+          <a:extLst>
+            <a:ext uri="{909E8E84-426E-40DD-AFC4-6F175D3DCCD1}">
+              <a14:hiddenFill xmlns:a14="http://schemas.microsoft.com/office/drawing/2010/main">
+                <a:solidFill>
+                  <a:srgbClr val="FFFFFF"/>
+                </a:solidFill>
+              </a14:hiddenFill>
+            </a:ext>
+          </a:extLst>
+        </p:spPr>
+      </p:pic>
+      <p:pic>
+        <p:nvPicPr>
+          <p:cNvPr id="4" name="Picture 3">
+            <a:extLst>
+              <a:ext uri="{FF2B5EF4-FFF2-40B4-BE49-F238E27FC236}">
+                <a16:creationId xmlns:a16="http://schemas.microsoft.com/office/drawing/2014/main" id="{FC81E472-DF7D-4472-A39A-446CD1A978B8}"/>
+              </a:ext>
+            </a:extLst>
+          </p:cNvPr>
+          <p:cNvPicPr>
+            <a:picLocks noChangeAspect="1" noChangeArrowheads="1"/>
+          </p:cNvPicPr>
+          <p:nvPr/>
+        </p:nvPicPr>
+        <p:blipFill rotWithShape="1">
+          <a:blip r:embed="rId2">
+            <a:extLst>
+              <a:ext uri="{28A0092B-C50C-407E-A947-70E740481C1C}">
+                <a14:useLocalDpi xmlns:a14="http://schemas.microsoft.com/office/drawing/2010/main" val="0"/>
+              </a:ext>
+            </a:extLst>
+          </a:blip>
+          <a:srcRect l="87629" t="12546" r="1790" b="46785"/>
+          <a:stretch/>
+        </p:blipFill>
+        <p:spPr bwMode="auto">
+          <a:xfrm rot="2700000">
+            <a:off x="-342541" y="-1706218"/>
+            <a:ext cx="2289586" cy="4981887"/>
+          </a:xfrm>
+          <a:prstGeom prst="rect">
+            <a:avLst/>
+          </a:prstGeom>
+          <a:noFill/>
+          <a:extLst>
+            <a:ext uri="{909E8E84-426E-40DD-AFC4-6F175D3DCCD1}">
+              <a14:hiddenFill xmlns:a14="http://schemas.microsoft.com/office/drawing/2010/main">
+                <a:solidFill>
+                  <a:srgbClr val="FFFFFF"/>
+                </a:solidFill>
+              </a14:hiddenFill>
+            </a:ext>
+          </a:extLst>
+        </p:spPr>
+      </p:pic>
+      <p:sp>
+        <p:nvSpPr>
+          <p:cNvPr id="8" name="TextBox 7">
+            <a:extLst>
+              <a:ext uri="{FF2B5EF4-FFF2-40B4-BE49-F238E27FC236}">
+                <a16:creationId xmlns:a16="http://schemas.microsoft.com/office/drawing/2014/main" id="{607A254E-0916-449F-83F3-192B4CE66B02}"/>
               </a:ext>
             </a:extLst>
           </p:cNvPr>
@@ -3809,8 +4243,8 @@
         </p:nvSpPr>
         <p:spPr>
           <a:xfrm>
-            <a:off x="4886374" y="631414"/>
-            <a:ext cx="2419252" cy="646331"/>
+            <a:off x="4120331" y="2505670"/>
+            <a:ext cx="3951338" cy="923330"/>
           </a:xfrm>
           <a:prstGeom prst="rect">
             <a:avLst/>
@@ -3824,10 +4258,10 @@
           <a:lstStyle/>
           <a:p>
             <a:r>
-              <a:rPr lang="en-US" sz="3600" dirty="0">
+              <a:rPr lang="en-US" sz="5400" dirty="0">
                 <a:latin typeface="Aileron Black" panose="00000A00000000000000" pitchFamily="50" charset="0"/>
               </a:rPr>
-              <a:t>Appendix</a:t>
+              <a:t>Thank you!</a:t>
             </a:r>
           </a:p>
         </p:txBody>
@@ -3835,7 +4269,7 @@
     </p:spTree>
     <p:extLst>
       <p:ext uri="{BB962C8B-B14F-4D97-AF65-F5344CB8AC3E}">
-        <p14:creationId xmlns:p14="http://schemas.microsoft.com/office/powerpoint/2010/main" val="249131810"/>
+        <p14:creationId xmlns:p14="http://schemas.microsoft.com/office/powerpoint/2010/main" val="3800282122"/>
       </p:ext>
     </p:extLst>
   </p:cSld>
@@ -3845,7 +4279,7 @@
 </p:sld>
 </file>
 
-<file path=ppt/slides/slide2.xml><?xml version="1.0" encoding="utf-8"?>
+<file path=ppt/slides/slide12.xml><?xml version="1.0" encoding="utf-8"?>
 <p:sld xmlns:a="http://schemas.openxmlformats.org/drawingml/2006/main" xmlns:r="http://schemas.openxmlformats.org/officeDocument/2006/relationships" xmlns:p="http://schemas.openxmlformats.org/presentationml/2006/main">
   <p:cSld>
     <p:spTree>
@@ -3862,12 +4296,87 @@
           <a:chExt cx="0" cy="0"/>
         </a:xfrm>
       </p:grpSpPr>
+      <p:sp>
+        <p:nvSpPr>
+          <p:cNvPr id="4" name="TextBox 3">
+            <a:extLst>
+              <a:ext uri="{FF2B5EF4-FFF2-40B4-BE49-F238E27FC236}">
+                <a16:creationId xmlns:a16="http://schemas.microsoft.com/office/drawing/2014/main" id="{343EADB8-90C4-42F5-A1F4-794E8605A3BF}"/>
+              </a:ext>
+            </a:extLst>
+          </p:cNvPr>
+          <p:cNvSpPr txBox="1"/>
+          <p:nvPr/>
+        </p:nvSpPr>
+        <p:spPr>
+          <a:xfrm>
+            <a:off x="4886374" y="1303767"/>
+            <a:ext cx="2419252" cy="646331"/>
+          </a:xfrm>
+          <a:prstGeom prst="rect">
+            <a:avLst/>
+          </a:prstGeom>
+          <a:noFill/>
+        </p:spPr>
+        <p:txBody>
+          <a:bodyPr wrap="none" rtlCol="0">
+            <a:spAutoFit/>
+          </a:bodyPr>
+          <a:lstStyle/>
+          <a:p>
+            <a:r>
+              <a:rPr lang="en-US" sz="3600" dirty="0">
+                <a:latin typeface="Aileron Black" panose="00000A00000000000000" pitchFamily="50" charset="0"/>
+              </a:rPr>
+              <a:t>Appendix</a:t>
+            </a:r>
+          </a:p>
+        </p:txBody>
+      </p:sp>
+      <p:sp>
+        <p:nvSpPr>
+          <p:cNvPr id="2" name="TextBox 1">
+            <a:extLst>
+              <a:ext uri="{FF2B5EF4-FFF2-40B4-BE49-F238E27FC236}">
+                <a16:creationId xmlns:a16="http://schemas.microsoft.com/office/drawing/2014/main" id="{4756651C-6A95-440A-8491-9CB41E3AF182}"/>
+              </a:ext>
+            </a:extLst>
+          </p:cNvPr>
+          <p:cNvSpPr txBox="1"/>
+          <p:nvPr/>
+        </p:nvSpPr>
+        <p:spPr>
+          <a:xfrm>
+            <a:off x="1775618" y="2889923"/>
+            <a:ext cx="8640763" cy="369332"/>
+          </a:xfrm>
+          <a:prstGeom prst="rect">
+            <a:avLst/>
+          </a:prstGeom>
+          <a:noFill/>
+        </p:spPr>
+        <p:txBody>
+          <a:bodyPr wrap="none" rtlCol="0">
+            <a:spAutoFit/>
+          </a:bodyPr>
+          <a:lstStyle/>
+          <a:p>
+            <a:r>
+              <a:rPr lang="en-US" dirty="0">
+                <a:hlinkClick r:id="rId2"/>
+              </a:rPr>
+              <a:t>https://github.com/hossain-shahriar/OSHA-2021-Data-Analytics/blob/main/Nutrien.ipynb</a:t>
+            </a:r>
+            <a:endParaRPr lang="en-US" dirty="0"/>
+          </a:p>
+        </p:txBody>
+      </p:sp>
       <p:pic>
         <p:nvPicPr>
-          <p:cNvPr id="1026" name="Picture 2">
-            <a:extLst>
-              <a:ext uri="{FF2B5EF4-FFF2-40B4-BE49-F238E27FC236}">
-                <a16:creationId xmlns:a16="http://schemas.microsoft.com/office/drawing/2014/main" id="{2E01B72B-2ABD-4C9C-843C-77B8E5D7BD85}"/>
+          <p:cNvPr id="5" name="Picture 3">
+            <a:extLst>
+              <a:ext uri="{FF2B5EF4-FFF2-40B4-BE49-F238E27FC236}">
+                <a16:creationId xmlns:a16="http://schemas.microsoft.com/office/drawing/2014/main" id="{1C4EDB79-4FF3-4E0E-B1F3-18418A79E4BF}"/>
               </a:ext>
             </a:extLst>
           </p:cNvPr>
@@ -3877,343 +4386,7 @@
           <p:nvPr/>
         </p:nvPicPr>
         <p:blipFill rotWithShape="1">
-          <a:blip r:embed="rId2">
-            <a:alphaModFix amt="35000"/>
-            <a:extLst>
-              <a:ext uri="{28A0092B-C50C-407E-A947-70E740481C1C}">
-                <a14:useLocalDpi xmlns:a14="http://schemas.microsoft.com/office/drawing/2010/main" val="0"/>
-              </a:ext>
-            </a:extLst>
-          </a:blip>
-          <a:srcRect r="27199"/>
-          <a:stretch/>
-        </p:blipFill>
-        <p:spPr bwMode="auto">
-          <a:xfrm>
-            <a:off x="-1" y="0"/>
-            <a:ext cx="12192001" cy="6858000"/>
-          </a:xfrm>
-          <a:prstGeom prst="rect">
-            <a:avLst/>
-          </a:prstGeom>
-          <a:noFill/>
-          <a:extLst>
-            <a:ext uri="{909E8E84-426E-40DD-AFC4-6F175D3DCCD1}">
-              <a14:hiddenFill xmlns:a14="http://schemas.microsoft.com/office/drawing/2010/main">
-                <a:solidFill>
-                  <a:srgbClr val="FFFFFF"/>
-                </a:solidFill>
-              </a14:hiddenFill>
-            </a:ext>
-          </a:extLst>
-        </p:spPr>
-      </p:pic>
-      <p:sp>
-        <p:nvSpPr>
-          <p:cNvPr id="4" name="TextBox 3">
-            <a:extLst>
-              <a:ext uri="{FF2B5EF4-FFF2-40B4-BE49-F238E27FC236}">
-                <a16:creationId xmlns:a16="http://schemas.microsoft.com/office/drawing/2014/main" id="{CF96F2A7-65F0-4E90-9352-398775BDF2D3}"/>
-              </a:ext>
-            </a:extLst>
-          </p:cNvPr>
-          <p:cNvSpPr txBox="1"/>
-          <p:nvPr/>
-        </p:nvSpPr>
-        <p:spPr>
-          <a:xfrm>
-            <a:off x="3933275" y="941294"/>
-            <a:ext cx="4187878" cy="646331"/>
-          </a:xfrm>
-          <a:prstGeom prst="rect">
-            <a:avLst/>
-          </a:prstGeom>
-          <a:noFill/>
-        </p:spPr>
-        <p:txBody>
-          <a:bodyPr wrap="none" rtlCol="0">
-            <a:spAutoFit/>
-          </a:bodyPr>
-          <a:lstStyle/>
-          <a:p>
-            <a:r>
-              <a:rPr lang="en-US" sz="3600" dirty="0">
-                <a:latin typeface="Aileron Black" panose="00000A00000000000000" pitchFamily="50" charset="0"/>
-              </a:rPr>
-              <a:t>Table of Contents</a:t>
-            </a:r>
-          </a:p>
-        </p:txBody>
-      </p:sp>
-      <p:sp>
-        <p:nvSpPr>
-          <p:cNvPr id="5" name="TextBox 4">
-            <a:extLst>
-              <a:ext uri="{FF2B5EF4-FFF2-40B4-BE49-F238E27FC236}">
-                <a16:creationId xmlns:a16="http://schemas.microsoft.com/office/drawing/2014/main" id="{2CCD3489-9E23-42D9-9351-DB3F060EE956}"/>
-              </a:ext>
-            </a:extLst>
-          </p:cNvPr>
-          <p:cNvSpPr txBox="1"/>
-          <p:nvPr/>
-        </p:nvSpPr>
-        <p:spPr>
-          <a:xfrm>
-            <a:off x="1434354" y="2147163"/>
-            <a:ext cx="4592860" cy="3244991"/>
-          </a:xfrm>
-          <a:prstGeom prst="rect">
-            <a:avLst/>
-          </a:prstGeom>
-          <a:noFill/>
-        </p:spPr>
-        <p:txBody>
-          <a:bodyPr wrap="none" rtlCol="0">
-            <a:spAutoFit/>
-          </a:bodyPr>
-          <a:lstStyle/>
-          <a:p>
-            <a:pPr marL="285750" indent="-285750">
-              <a:lnSpc>
-                <a:spcPct val="150000"/>
-              </a:lnSpc>
-              <a:buFont typeface="Arial" panose="020B0604020202020204" pitchFamily="34" charset="0"/>
-              <a:buChar char="•"/>
-            </a:pPr>
-            <a:r>
-              <a:rPr lang="en-US" sz="2800" dirty="0">
-                <a:latin typeface="Aileron" panose="00000500000000000000" pitchFamily="50" charset="0"/>
-              </a:rPr>
-              <a:t>Purpose of This Analysis</a:t>
-            </a:r>
-          </a:p>
-          <a:p>
-            <a:pPr marL="285750" indent="-285750">
-              <a:lnSpc>
-                <a:spcPct val="150000"/>
-              </a:lnSpc>
-              <a:buFont typeface="Arial" panose="020B0604020202020204" pitchFamily="34" charset="0"/>
-              <a:buChar char="•"/>
-            </a:pPr>
-            <a:r>
-              <a:rPr lang="en-US" sz="2800" dirty="0">
-                <a:latin typeface="Aileron" panose="00000500000000000000" pitchFamily="50" charset="0"/>
-              </a:rPr>
-              <a:t>Key Findings and Insights</a:t>
-            </a:r>
-          </a:p>
-          <a:p>
-            <a:pPr marL="285750" indent="-285750">
-              <a:lnSpc>
-                <a:spcPct val="150000"/>
-              </a:lnSpc>
-              <a:buFont typeface="Arial" panose="020B0604020202020204" pitchFamily="34" charset="0"/>
-              <a:buChar char="•"/>
-            </a:pPr>
-            <a:r>
-              <a:rPr lang="en-US" sz="2800" dirty="0">
-                <a:latin typeface="Aileron" panose="00000500000000000000" pitchFamily="50" charset="0"/>
-              </a:rPr>
-              <a:t>Interactive Dashboard</a:t>
-            </a:r>
-          </a:p>
-          <a:p>
-            <a:pPr marL="285750" indent="-285750">
-              <a:lnSpc>
-                <a:spcPct val="150000"/>
-              </a:lnSpc>
-              <a:buFont typeface="Arial" panose="020B0604020202020204" pitchFamily="34" charset="0"/>
-              <a:buChar char="•"/>
-            </a:pPr>
-            <a:r>
-              <a:rPr lang="en-US" sz="2800" dirty="0">
-                <a:latin typeface="Aileron" panose="00000500000000000000" pitchFamily="50" charset="0"/>
-              </a:rPr>
-              <a:t>Conclusion</a:t>
-            </a:r>
-          </a:p>
-          <a:p>
-            <a:pPr marL="285750" indent="-285750">
-              <a:lnSpc>
-                <a:spcPct val="150000"/>
-              </a:lnSpc>
-              <a:buFont typeface="Arial" panose="020B0604020202020204" pitchFamily="34" charset="0"/>
-              <a:buChar char="•"/>
-            </a:pPr>
-            <a:r>
-              <a:rPr lang="en-US" sz="2800" dirty="0">
-                <a:latin typeface="Aileron" panose="00000500000000000000" pitchFamily="50" charset="0"/>
-              </a:rPr>
-              <a:t>Appendix</a:t>
-            </a:r>
-          </a:p>
-        </p:txBody>
-      </p:sp>
-    </p:spTree>
-    <p:extLst>
-      <p:ext uri="{BB962C8B-B14F-4D97-AF65-F5344CB8AC3E}">
-        <p14:creationId xmlns:p14="http://schemas.microsoft.com/office/powerpoint/2010/main" val="275689173"/>
-      </p:ext>
-    </p:extLst>
-  </p:cSld>
-  <p:clrMapOvr>
-    <a:masterClrMapping/>
-  </p:clrMapOvr>
-</p:sld>
-</file>
-
-<file path=ppt/slides/slide3.xml><?xml version="1.0" encoding="utf-8"?>
-<p:sld xmlns:a="http://schemas.openxmlformats.org/drawingml/2006/main" xmlns:r="http://schemas.openxmlformats.org/officeDocument/2006/relationships" xmlns:p="http://schemas.openxmlformats.org/presentationml/2006/main">
-  <p:cSld>
-    <p:spTree>
-      <p:nvGrpSpPr>
-        <p:cNvPr id="1" name=""/>
-        <p:cNvGrpSpPr/>
-        <p:nvPr/>
-      </p:nvGrpSpPr>
-      <p:grpSpPr>
-        <a:xfrm>
-          <a:off x="0" y="0"/>
-          <a:ext cx="0" cy="0"/>
-          <a:chOff x="0" y="0"/>
-          <a:chExt cx="0" cy="0"/>
-        </a:xfrm>
-      </p:grpSpPr>
-      <p:sp>
-        <p:nvSpPr>
-          <p:cNvPr id="4" name="TextBox 3">
-            <a:extLst>
-              <a:ext uri="{FF2B5EF4-FFF2-40B4-BE49-F238E27FC236}">
-                <a16:creationId xmlns:a16="http://schemas.microsoft.com/office/drawing/2014/main" id="{DD5143C6-8E88-4134-845E-DF894A3F7B4E}"/>
-              </a:ext>
-            </a:extLst>
-          </p:cNvPr>
-          <p:cNvSpPr txBox="1"/>
-          <p:nvPr/>
-        </p:nvSpPr>
-        <p:spPr>
-          <a:xfrm>
-            <a:off x="3248105" y="1185134"/>
-            <a:ext cx="5695790" cy="646331"/>
-          </a:xfrm>
-          <a:prstGeom prst="rect">
-            <a:avLst/>
-          </a:prstGeom>
-          <a:noFill/>
-        </p:spPr>
-        <p:txBody>
-          <a:bodyPr wrap="none" rtlCol="0">
-            <a:spAutoFit/>
-          </a:bodyPr>
-          <a:lstStyle/>
-          <a:p>
-            <a:r>
-              <a:rPr lang="en-US" sz="3600" dirty="0">
-                <a:latin typeface="Aileron Black" panose="00000A00000000000000" pitchFamily="50" charset="0"/>
-              </a:rPr>
-              <a:t>Purpose of This Analysis</a:t>
-            </a:r>
-          </a:p>
-        </p:txBody>
-      </p:sp>
-      <p:sp>
-        <p:nvSpPr>
-          <p:cNvPr id="5" name="TextBox 4">
-            <a:extLst>
-              <a:ext uri="{FF2B5EF4-FFF2-40B4-BE49-F238E27FC236}">
-                <a16:creationId xmlns:a16="http://schemas.microsoft.com/office/drawing/2014/main" id="{35F7CF03-F1E4-403E-8F17-E4FB4E50E52E}"/>
-              </a:ext>
-            </a:extLst>
-          </p:cNvPr>
-          <p:cNvSpPr txBox="1"/>
-          <p:nvPr/>
-        </p:nvSpPr>
-        <p:spPr>
-          <a:xfrm>
-            <a:off x="1163320" y="2644170"/>
-            <a:ext cx="9865360" cy="1569660"/>
-          </a:xfrm>
-          <a:prstGeom prst="rect">
-            <a:avLst/>
-          </a:prstGeom>
-          <a:noFill/>
-        </p:spPr>
-        <p:txBody>
-          <a:bodyPr wrap="square" rtlCol="0">
-            <a:spAutoFit/>
-          </a:bodyPr>
-          <a:lstStyle/>
-          <a:p>
-            <a:r>
-              <a:rPr lang="en-US" sz="2400" dirty="0">
-                <a:latin typeface="Aileron SemiBold" panose="00000700000000000000" pitchFamily="50" charset="0"/>
-              </a:rPr>
-              <a:t>"Analyzing workplace injury trends and patterns to uncover </a:t>
-            </a:r>
-            <a:r>
-              <a:rPr lang="en-US" sz="2400" u="sng" dirty="0">
-                <a:solidFill>
-                  <a:srgbClr val="C00000"/>
-                </a:solidFill>
-                <a:latin typeface="Aileron SemiBold" panose="00000700000000000000" pitchFamily="50" charset="0"/>
-              </a:rPr>
-              <a:t>key insights</a:t>
-            </a:r>
-            <a:r>
-              <a:rPr lang="en-US" sz="2400" dirty="0">
-                <a:latin typeface="Aileron SemiBold" panose="00000700000000000000" pitchFamily="50" charset="0"/>
-              </a:rPr>
-              <a:t> that can guide the development of </a:t>
-            </a:r>
-            <a:r>
-              <a:rPr lang="en-US" sz="2400" u="sng" dirty="0">
-                <a:solidFill>
-                  <a:srgbClr val="C00000"/>
-                </a:solidFill>
-                <a:latin typeface="Aileron SemiBold" panose="00000700000000000000" pitchFamily="50" charset="0"/>
-              </a:rPr>
-              <a:t>effective safety initiatives</a:t>
-            </a:r>
-            <a:r>
-              <a:rPr lang="en-US" sz="2400" dirty="0">
-                <a:latin typeface="Aileron SemiBold" panose="00000700000000000000" pitchFamily="50" charset="0"/>
-              </a:rPr>
-              <a:t>, enhance workplace conditions, and </a:t>
-            </a:r>
-            <a:r>
-              <a:rPr lang="en-US" sz="2400" u="sng" dirty="0">
-                <a:solidFill>
-                  <a:srgbClr val="C00000"/>
-                </a:solidFill>
-                <a:latin typeface="Aileron SemiBold" panose="00000700000000000000" pitchFamily="50" charset="0"/>
-              </a:rPr>
-              <a:t>reduce the risk </a:t>
-            </a:r>
-            <a:r>
-              <a:rPr lang="en-US" sz="2400" dirty="0">
-                <a:latin typeface="Aileron SemiBold" panose="00000700000000000000" pitchFamily="50" charset="0"/>
-              </a:rPr>
-              <a:t>of severe incidents across industries."</a:t>
-            </a:r>
-          </a:p>
-        </p:txBody>
-      </p:sp>
-      <p:pic>
-        <p:nvPicPr>
-          <p:cNvPr id="2051" name="Picture 3">
-            <a:extLst>
-              <a:ext uri="{FF2B5EF4-FFF2-40B4-BE49-F238E27FC236}">
-                <a16:creationId xmlns:a16="http://schemas.microsoft.com/office/drawing/2014/main" id="{AB33F116-EB4C-4227-BE0C-5675A54C5278}"/>
-              </a:ext>
-            </a:extLst>
-          </p:cNvPr>
-          <p:cNvPicPr>
-            <a:picLocks noChangeAspect="1" noChangeArrowheads="1"/>
-          </p:cNvPicPr>
-          <p:nvPr/>
-        </p:nvPicPr>
-        <p:blipFill rotWithShape="1">
-          <a:blip r:embed="rId2">
+          <a:blip r:embed="rId3">
             <a:extLst>
               <a:ext uri="{28A0092B-C50C-407E-A947-70E740481C1C}">
                 <a14:useLocalDpi xmlns:a14="http://schemas.microsoft.com/office/drawing/2010/main" val="0"/>
@@ -4246,6 +4419,905 @@
     </p:spTree>
     <p:extLst>
       <p:ext uri="{BB962C8B-B14F-4D97-AF65-F5344CB8AC3E}">
+        <p14:creationId xmlns:p14="http://schemas.microsoft.com/office/powerpoint/2010/main" val="249131810"/>
+      </p:ext>
+    </p:extLst>
+  </p:cSld>
+  <p:clrMapOvr>
+    <a:masterClrMapping/>
+  </p:clrMapOvr>
+  <p:timing>
+    <p:tnLst>
+      <p:par>
+        <p:cTn id="1" dur="indefinite" restart="never" nodeType="tmRoot">
+          <p:childTnLst>
+            <p:seq concurrent="1" nextAc="seek">
+              <p:cTn id="2" dur="indefinite" nodeType="mainSeq">
+                <p:childTnLst>
+                  <p:par>
+                    <p:cTn id="3" fill="hold">
+                      <p:stCondLst>
+                        <p:cond delay="indefinite"/>
+                      </p:stCondLst>
+                      <p:childTnLst>
+                        <p:par>
+                          <p:cTn id="4" fill="hold">
+                            <p:stCondLst>
+                              <p:cond delay="0"/>
+                            </p:stCondLst>
+                            <p:childTnLst>
+                              <p:par>
+                                <p:cTn id="5" presetID="1" presetClass="entr" presetSubtype="0" fill="hold" grpId="0" nodeType="clickEffect">
+                                  <p:stCondLst>
+                                    <p:cond delay="0"/>
+                                  </p:stCondLst>
+                                  <p:childTnLst>
+                                    <p:set>
+                                      <p:cBhvr>
+                                        <p:cTn id="6" dur="1" fill="hold">
+                                          <p:stCondLst>
+                                            <p:cond delay="0"/>
+                                          </p:stCondLst>
+                                        </p:cTn>
+                                        <p:tgtEl>
+                                          <p:spTgt spid="2"/>
+                                        </p:tgtEl>
+                                        <p:attrNameLst>
+                                          <p:attrName>style.visibility</p:attrName>
+                                        </p:attrNameLst>
+                                      </p:cBhvr>
+                                      <p:to>
+                                        <p:strVal val="visible"/>
+                                      </p:to>
+                                    </p:set>
+                                  </p:childTnLst>
+                                </p:cTn>
+                              </p:par>
+                            </p:childTnLst>
+                          </p:cTn>
+                        </p:par>
+                      </p:childTnLst>
+                    </p:cTn>
+                  </p:par>
+                </p:childTnLst>
+              </p:cTn>
+              <p:prevCondLst>
+                <p:cond evt="onPrev" delay="0">
+                  <p:tgtEl>
+                    <p:sldTgt/>
+                  </p:tgtEl>
+                </p:cond>
+              </p:prevCondLst>
+              <p:nextCondLst>
+                <p:cond evt="onNext" delay="0">
+                  <p:tgtEl>
+                    <p:sldTgt/>
+                  </p:tgtEl>
+                </p:cond>
+              </p:nextCondLst>
+            </p:seq>
+          </p:childTnLst>
+        </p:cTn>
+      </p:par>
+    </p:tnLst>
+    <p:bldLst>
+      <p:bldP spid="2" grpId="0"/>
+    </p:bldLst>
+  </p:timing>
+</p:sld>
+</file>
+
+<file path=ppt/slides/slide2.xml><?xml version="1.0" encoding="utf-8"?>
+<p:sld xmlns:a="http://schemas.openxmlformats.org/drawingml/2006/main" xmlns:r="http://schemas.openxmlformats.org/officeDocument/2006/relationships" xmlns:p="http://schemas.openxmlformats.org/presentationml/2006/main">
+  <p:cSld>
+    <p:spTree>
+      <p:nvGrpSpPr>
+        <p:cNvPr id="1" name=""/>
+        <p:cNvGrpSpPr/>
+        <p:nvPr/>
+      </p:nvGrpSpPr>
+      <p:grpSpPr>
+        <a:xfrm>
+          <a:off x="0" y="0"/>
+          <a:ext cx="0" cy="0"/>
+          <a:chOff x="0" y="0"/>
+          <a:chExt cx="0" cy="0"/>
+        </a:xfrm>
+      </p:grpSpPr>
+      <p:pic>
+        <p:nvPicPr>
+          <p:cNvPr id="1026" name="Picture 2">
+            <a:extLst>
+              <a:ext uri="{FF2B5EF4-FFF2-40B4-BE49-F238E27FC236}">
+                <a16:creationId xmlns:a16="http://schemas.microsoft.com/office/drawing/2014/main" id="{2E01B72B-2ABD-4C9C-843C-77B8E5D7BD85}"/>
+              </a:ext>
+            </a:extLst>
+          </p:cNvPr>
+          <p:cNvPicPr>
+            <a:picLocks noChangeAspect="1" noChangeArrowheads="1"/>
+          </p:cNvPicPr>
+          <p:nvPr/>
+        </p:nvPicPr>
+        <p:blipFill rotWithShape="1">
+          <a:blip r:embed="rId2">
+            <a:alphaModFix amt="35000"/>
+            <a:extLst>
+              <a:ext uri="{28A0092B-C50C-407E-A947-70E740481C1C}">
+                <a14:useLocalDpi xmlns:a14="http://schemas.microsoft.com/office/drawing/2010/main" val="0"/>
+              </a:ext>
+            </a:extLst>
+          </a:blip>
+          <a:srcRect r="27199"/>
+          <a:stretch/>
+        </p:blipFill>
+        <p:spPr bwMode="auto">
+          <a:xfrm>
+            <a:off x="-1" y="0"/>
+            <a:ext cx="12192001" cy="6858000"/>
+          </a:xfrm>
+          <a:prstGeom prst="rect">
+            <a:avLst/>
+          </a:prstGeom>
+          <a:noFill/>
+          <a:extLst>
+            <a:ext uri="{909E8E84-426E-40DD-AFC4-6F175D3DCCD1}">
+              <a14:hiddenFill xmlns:a14="http://schemas.microsoft.com/office/drawing/2010/main">
+                <a:solidFill>
+                  <a:srgbClr val="FFFFFF"/>
+                </a:solidFill>
+              </a14:hiddenFill>
+            </a:ext>
+          </a:extLst>
+        </p:spPr>
+      </p:pic>
+      <p:sp>
+        <p:nvSpPr>
+          <p:cNvPr id="4" name="TextBox 3">
+            <a:extLst>
+              <a:ext uri="{FF2B5EF4-FFF2-40B4-BE49-F238E27FC236}">
+                <a16:creationId xmlns:a16="http://schemas.microsoft.com/office/drawing/2014/main" id="{CF96F2A7-65F0-4E90-9352-398775BDF2D3}"/>
+              </a:ext>
+            </a:extLst>
+          </p:cNvPr>
+          <p:cNvSpPr txBox="1"/>
+          <p:nvPr/>
+        </p:nvSpPr>
+        <p:spPr>
+          <a:xfrm>
+            <a:off x="3933275" y="941294"/>
+            <a:ext cx="4187878" cy="646331"/>
+          </a:xfrm>
+          <a:prstGeom prst="rect">
+            <a:avLst/>
+          </a:prstGeom>
+          <a:noFill/>
+        </p:spPr>
+        <p:txBody>
+          <a:bodyPr wrap="none" rtlCol="0">
+            <a:spAutoFit/>
+          </a:bodyPr>
+          <a:lstStyle/>
+          <a:p>
+            <a:r>
+              <a:rPr lang="en-US" sz="3600" dirty="0">
+                <a:latin typeface="Aileron Black" panose="00000A00000000000000" pitchFamily="50" charset="0"/>
+              </a:rPr>
+              <a:t>Table of Contents</a:t>
+            </a:r>
+          </a:p>
+        </p:txBody>
+      </p:sp>
+      <p:sp>
+        <p:nvSpPr>
+          <p:cNvPr id="5" name="TextBox 4">
+            <a:extLst>
+              <a:ext uri="{FF2B5EF4-FFF2-40B4-BE49-F238E27FC236}">
+                <a16:creationId xmlns:a16="http://schemas.microsoft.com/office/drawing/2014/main" id="{2CCD3489-9E23-42D9-9351-DB3F060EE956}"/>
+              </a:ext>
+            </a:extLst>
+          </p:cNvPr>
+          <p:cNvSpPr txBox="1"/>
+          <p:nvPr/>
+        </p:nvSpPr>
+        <p:spPr>
+          <a:xfrm>
+            <a:off x="1434354" y="2147163"/>
+            <a:ext cx="4592860" cy="3244991"/>
+          </a:xfrm>
+          <a:prstGeom prst="rect">
+            <a:avLst/>
+          </a:prstGeom>
+          <a:noFill/>
+        </p:spPr>
+        <p:txBody>
+          <a:bodyPr wrap="none" rtlCol="0">
+            <a:spAutoFit/>
+          </a:bodyPr>
+          <a:lstStyle/>
+          <a:p>
+            <a:pPr marL="285750" indent="-285750">
+              <a:lnSpc>
+                <a:spcPct val="150000"/>
+              </a:lnSpc>
+              <a:buFont typeface="Arial" panose="020B0604020202020204" pitchFamily="34" charset="0"/>
+              <a:buChar char="•"/>
+            </a:pPr>
+            <a:r>
+              <a:rPr lang="en-US" sz="2800" dirty="0">
+                <a:latin typeface="Aileron" panose="00000500000000000000" pitchFamily="50" charset="0"/>
+              </a:rPr>
+              <a:t>Purpose of This Analysis</a:t>
+            </a:r>
+          </a:p>
+          <a:p>
+            <a:pPr marL="285750" indent="-285750">
+              <a:lnSpc>
+                <a:spcPct val="150000"/>
+              </a:lnSpc>
+              <a:buFont typeface="Arial" panose="020B0604020202020204" pitchFamily="34" charset="0"/>
+              <a:buChar char="•"/>
+            </a:pPr>
+            <a:r>
+              <a:rPr lang="en-US" sz="2800" dirty="0">
+                <a:latin typeface="Aileron" panose="00000500000000000000" pitchFamily="50" charset="0"/>
+              </a:rPr>
+              <a:t>Key Findings and Insights</a:t>
+            </a:r>
+          </a:p>
+          <a:p>
+            <a:pPr marL="285750" indent="-285750">
+              <a:lnSpc>
+                <a:spcPct val="150000"/>
+              </a:lnSpc>
+              <a:buFont typeface="Arial" panose="020B0604020202020204" pitchFamily="34" charset="0"/>
+              <a:buChar char="•"/>
+            </a:pPr>
+            <a:r>
+              <a:rPr lang="en-US" sz="2800" dirty="0">
+                <a:latin typeface="Aileron" panose="00000500000000000000" pitchFamily="50" charset="0"/>
+              </a:rPr>
+              <a:t>Interactive Dashboard</a:t>
+            </a:r>
+          </a:p>
+          <a:p>
+            <a:pPr marL="285750" indent="-285750">
+              <a:lnSpc>
+                <a:spcPct val="150000"/>
+              </a:lnSpc>
+              <a:buFont typeface="Arial" panose="020B0604020202020204" pitchFamily="34" charset="0"/>
+              <a:buChar char="•"/>
+            </a:pPr>
+            <a:r>
+              <a:rPr lang="en-US" sz="2800" dirty="0">
+                <a:latin typeface="Aileron" panose="00000500000000000000" pitchFamily="50" charset="0"/>
+              </a:rPr>
+              <a:t>Conclusion</a:t>
+            </a:r>
+          </a:p>
+          <a:p>
+            <a:pPr marL="285750" indent="-285750">
+              <a:lnSpc>
+                <a:spcPct val="150000"/>
+              </a:lnSpc>
+              <a:buFont typeface="Arial" panose="020B0604020202020204" pitchFamily="34" charset="0"/>
+              <a:buChar char="•"/>
+            </a:pPr>
+            <a:r>
+              <a:rPr lang="en-US" sz="2800" dirty="0">
+                <a:latin typeface="Aileron" panose="00000500000000000000" pitchFamily="50" charset="0"/>
+              </a:rPr>
+              <a:t>Appendix</a:t>
+            </a:r>
+          </a:p>
+        </p:txBody>
+      </p:sp>
+    </p:spTree>
+    <p:extLst>
+      <p:ext uri="{BB962C8B-B14F-4D97-AF65-F5344CB8AC3E}">
+        <p14:creationId xmlns:p14="http://schemas.microsoft.com/office/powerpoint/2010/main" val="275689173"/>
+      </p:ext>
+    </p:extLst>
+  </p:cSld>
+  <p:clrMapOvr>
+    <a:masterClrMapping/>
+  </p:clrMapOvr>
+  <p:timing>
+    <p:tnLst>
+      <p:par>
+        <p:cTn id="1" dur="indefinite" restart="never" nodeType="tmRoot">
+          <p:childTnLst>
+            <p:seq concurrent="1" nextAc="seek">
+              <p:cTn id="2" dur="indefinite" nodeType="mainSeq">
+                <p:childTnLst>
+                  <p:par>
+                    <p:cTn id="3" fill="hold">
+                      <p:stCondLst>
+                        <p:cond delay="indefinite"/>
+                      </p:stCondLst>
+                      <p:childTnLst>
+                        <p:par>
+                          <p:cTn id="4" fill="hold">
+                            <p:stCondLst>
+                              <p:cond delay="0"/>
+                            </p:stCondLst>
+                            <p:childTnLst>
+                              <p:par>
+                                <p:cTn id="5" presetID="1" presetClass="entr" presetSubtype="0" fill="hold" nodeType="clickEffect">
+                                  <p:stCondLst>
+                                    <p:cond delay="0"/>
+                                  </p:stCondLst>
+                                  <p:childTnLst>
+                                    <p:set>
+                                      <p:cBhvr>
+                                        <p:cTn id="6" dur="1" fill="hold">
+                                          <p:stCondLst>
+                                            <p:cond delay="0"/>
+                                          </p:stCondLst>
+                                        </p:cTn>
+                                        <p:tgtEl>
+                                          <p:spTgt spid="5">
+                                            <p:txEl>
+                                              <p:pRg st="0" end="0"/>
+                                            </p:txEl>
+                                          </p:spTgt>
+                                        </p:tgtEl>
+                                        <p:attrNameLst>
+                                          <p:attrName>style.visibility</p:attrName>
+                                        </p:attrNameLst>
+                                      </p:cBhvr>
+                                      <p:to>
+                                        <p:strVal val="visible"/>
+                                      </p:to>
+                                    </p:set>
+                                  </p:childTnLst>
+                                </p:cTn>
+                              </p:par>
+                            </p:childTnLst>
+                          </p:cTn>
+                        </p:par>
+                      </p:childTnLst>
+                    </p:cTn>
+                  </p:par>
+                  <p:par>
+                    <p:cTn id="7" fill="hold">
+                      <p:stCondLst>
+                        <p:cond delay="indefinite"/>
+                      </p:stCondLst>
+                      <p:childTnLst>
+                        <p:par>
+                          <p:cTn id="8" fill="hold">
+                            <p:stCondLst>
+                              <p:cond delay="0"/>
+                            </p:stCondLst>
+                            <p:childTnLst>
+                              <p:par>
+                                <p:cTn id="9" presetID="1" presetClass="entr" presetSubtype="0" fill="hold" nodeType="clickEffect">
+                                  <p:stCondLst>
+                                    <p:cond delay="0"/>
+                                  </p:stCondLst>
+                                  <p:childTnLst>
+                                    <p:set>
+                                      <p:cBhvr>
+                                        <p:cTn id="10" dur="1" fill="hold">
+                                          <p:stCondLst>
+                                            <p:cond delay="0"/>
+                                          </p:stCondLst>
+                                        </p:cTn>
+                                        <p:tgtEl>
+                                          <p:spTgt spid="5">
+                                            <p:txEl>
+                                              <p:pRg st="1" end="1"/>
+                                            </p:txEl>
+                                          </p:spTgt>
+                                        </p:tgtEl>
+                                        <p:attrNameLst>
+                                          <p:attrName>style.visibility</p:attrName>
+                                        </p:attrNameLst>
+                                      </p:cBhvr>
+                                      <p:to>
+                                        <p:strVal val="visible"/>
+                                      </p:to>
+                                    </p:set>
+                                  </p:childTnLst>
+                                </p:cTn>
+                              </p:par>
+                            </p:childTnLst>
+                          </p:cTn>
+                        </p:par>
+                      </p:childTnLst>
+                    </p:cTn>
+                  </p:par>
+                  <p:par>
+                    <p:cTn id="11" fill="hold">
+                      <p:stCondLst>
+                        <p:cond delay="indefinite"/>
+                      </p:stCondLst>
+                      <p:childTnLst>
+                        <p:par>
+                          <p:cTn id="12" fill="hold">
+                            <p:stCondLst>
+                              <p:cond delay="0"/>
+                            </p:stCondLst>
+                            <p:childTnLst>
+                              <p:par>
+                                <p:cTn id="13" presetID="1" presetClass="entr" presetSubtype="0" fill="hold" nodeType="clickEffect">
+                                  <p:stCondLst>
+                                    <p:cond delay="0"/>
+                                  </p:stCondLst>
+                                  <p:childTnLst>
+                                    <p:set>
+                                      <p:cBhvr>
+                                        <p:cTn id="14" dur="1" fill="hold">
+                                          <p:stCondLst>
+                                            <p:cond delay="0"/>
+                                          </p:stCondLst>
+                                        </p:cTn>
+                                        <p:tgtEl>
+                                          <p:spTgt spid="5">
+                                            <p:txEl>
+                                              <p:pRg st="2" end="2"/>
+                                            </p:txEl>
+                                          </p:spTgt>
+                                        </p:tgtEl>
+                                        <p:attrNameLst>
+                                          <p:attrName>style.visibility</p:attrName>
+                                        </p:attrNameLst>
+                                      </p:cBhvr>
+                                      <p:to>
+                                        <p:strVal val="visible"/>
+                                      </p:to>
+                                    </p:set>
+                                  </p:childTnLst>
+                                </p:cTn>
+                              </p:par>
+                            </p:childTnLst>
+                          </p:cTn>
+                        </p:par>
+                      </p:childTnLst>
+                    </p:cTn>
+                  </p:par>
+                  <p:par>
+                    <p:cTn id="15" fill="hold">
+                      <p:stCondLst>
+                        <p:cond delay="indefinite"/>
+                      </p:stCondLst>
+                      <p:childTnLst>
+                        <p:par>
+                          <p:cTn id="16" fill="hold">
+                            <p:stCondLst>
+                              <p:cond delay="0"/>
+                            </p:stCondLst>
+                            <p:childTnLst>
+                              <p:par>
+                                <p:cTn id="17" presetID="1" presetClass="entr" presetSubtype="0" fill="hold" nodeType="clickEffect">
+                                  <p:stCondLst>
+                                    <p:cond delay="0"/>
+                                  </p:stCondLst>
+                                  <p:childTnLst>
+                                    <p:set>
+                                      <p:cBhvr>
+                                        <p:cTn id="18" dur="1" fill="hold">
+                                          <p:stCondLst>
+                                            <p:cond delay="0"/>
+                                          </p:stCondLst>
+                                        </p:cTn>
+                                        <p:tgtEl>
+                                          <p:spTgt spid="5">
+                                            <p:txEl>
+                                              <p:pRg st="3" end="3"/>
+                                            </p:txEl>
+                                          </p:spTgt>
+                                        </p:tgtEl>
+                                        <p:attrNameLst>
+                                          <p:attrName>style.visibility</p:attrName>
+                                        </p:attrNameLst>
+                                      </p:cBhvr>
+                                      <p:to>
+                                        <p:strVal val="visible"/>
+                                      </p:to>
+                                    </p:set>
+                                  </p:childTnLst>
+                                </p:cTn>
+                              </p:par>
+                            </p:childTnLst>
+                          </p:cTn>
+                        </p:par>
+                      </p:childTnLst>
+                    </p:cTn>
+                  </p:par>
+                  <p:par>
+                    <p:cTn id="19" fill="hold">
+                      <p:stCondLst>
+                        <p:cond delay="indefinite"/>
+                      </p:stCondLst>
+                      <p:childTnLst>
+                        <p:par>
+                          <p:cTn id="20" fill="hold">
+                            <p:stCondLst>
+                              <p:cond delay="0"/>
+                            </p:stCondLst>
+                            <p:childTnLst>
+                              <p:par>
+                                <p:cTn id="21" presetID="1" presetClass="entr" presetSubtype="0" fill="hold" nodeType="clickEffect">
+                                  <p:stCondLst>
+                                    <p:cond delay="0"/>
+                                  </p:stCondLst>
+                                  <p:childTnLst>
+                                    <p:set>
+                                      <p:cBhvr>
+                                        <p:cTn id="22" dur="1" fill="hold">
+                                          <p:stCondLst>
+                                            <p:cond delay="0"/>
+                                          </p:stCondLst>
+                                        </p:cTn>
+                                        <p:tgtEl>
+                                          <p:spTgt spid="5">
+                                            <p:txEl>
+                                              <p:pRg st="4" end="4"/>
+                                            </p:txEl>
+                                          </p:spTgt>
+                                        </p:tgtEl>
+                                        <p:attrNameLst>
+                                          <p:attrName>style.visibility</p:attrName>
+                                        </p:attrNameLst>
+                                      </p:cBhvr>
+                                      <p:to>
+                                        <p:strVal val="visible"/>
+                                      </p:to>
+                                    </p:set>
+                                  </p:childTnLst>
+                                </p:cTn>
+                              </p:par>
+                            </p:childTnLst>
+                          </p:cTn>
+                        </p:par>
+                      </p:childTnLst>
+                    </p:cTn>
+                  </p:par>
+                </p:childTnLst>
+              </p:cTn>
+              <p:prevCondLst>
+                <p:cond evt="onPrev" delay="0">
+                  <p:tgtEl>
+                    <p:sldTgt/>
+                  </p:tgtEl>
+                </p:cond>
+              </p:prevCondLst>
+              <p:nextCondLst>
+                <p:cond evt="onNext" delay="0">
+                  <p:tgtEl>
+                    <p:sldTgt/>
+                  </p:tgtEl>
+                </p:cond>
+              </p:nextCondLst>
+            </p:seq>
+          </p:childTnLst>
+        </p:cTn>
+      </p:par>
+    </p:tnLst>
+  </p:timing>
+</p:sld>
+</file>
+
+<file path=ppt/slides/slide3.xml><?xml version="1.0" encoding="utf-8"?>
+<p:sld xmlns:a="http://schemas.openxmlformats.org/drawingml/2006/main" xmlns:r="http://schemas.openxmlformats.org/officeDocument/2006/relationships" xmlns:p="http://schemas.openxmlformats.org/presentationml/2006/main">
+  <p:cSld>
+    <p:spTree>
+      <p:nvGrpSpPr>
+        <p:cNvPr id="1" name=""/>
+        <p:cNvGrpSpPr/>
+        <p:nvPr/>
+      </p:nvGrpSpPr>
+      <p:grpSpPr>
+        <a:xfrm>
+          <a:off x="0" y="0"/>
+          <a:ext cx="0" cy="0"/>
+          <a:chOff x="0" y="0"/>
+          <a:chExt cx="0" cy="0"/>
+        </a:xfrm>
+      </p:grpSpPr>
+      <p:sp>
+        <p:nvSpPr>
+          <p:cNvPr id="4" name="TextBox 3">
+            <a:extLst>
+              <a:ext uri="{FF2B5EF4-FFF2-40B4-BE49-F238E27FC236}">
+                <a16:creationId xmlns:a16="http://schemas.microsoft.com/office/drawing/2014/main" id="{DD5143C6-8E88-4134-845E-DF894A3F7B4E}"/>
+              </a:ext>
+            </a:extLst>
+          </p:cNvPr>
+          <p:cNvSpPr txBox="1"/>
+          <p:nvPr/>
+        </p:nvSpPr>
+        <p:spPr>
+          <a:xfrm>
+            <a:off x="3248105" y="1185134"/>
+            <a:ext cx="5695790" cy="646331"/>
+          </a:xfrm>
+          <a:prstGeom prst="rect">
+            <a:avLst/>
+          </a:prstGeom>
+          <a:noFill/>
+        </p:spPr>
+        <p:txBody>
+          <a:bodyPr wrap="none" rtlCol="0">
+            <a:spAutoFit/>
+          </a:bodyPr>
+          <a:lstStyle/>
+          <a:p>
+            <a:r>
+              <a:rPr lang="en-US" sz="3600" dirty="0">
+                <a:latin typeface="Aileron Black" panose="00000A00000000000000" pitchFamily="50" charset="0"/>
+              </a:rPr>
+              <a:t>Purpose of This Analysis</a:t>
+            </a:r>
+          </a:p>
+        </p:txBody>
+      </p:sp>
+      <p:sp>
+        <p:nvSpPr>
+          <p:cNvPr id="5" name="TextBox 4">
+            <a:extLst>
+              <a:ext uri="{FF2B5EF4-FFF2-40B4-BE49-F238E27FC236}">
+                <a16:creationId xmlns:a16="http://schemas.microsoft.com/office/drawing/2014/main" id="{35F7CF03-F1E4-403E-8F17-E4FB4E50E52E}"/>
+              </a:ext>
+            </a:extLst>
+          </p:cNvPr>
+          <p:cNvSpPr txBox="1"/>
+          <p:nvPr/>
+        </p:nvSpPr>
+        <p:spPr>
+          <a:xfrm>
+            <a:off x="1163320" y="2644170"/>
+            <a:ext cx="9865360" cy="1569660"/>
+          </a:xfrm>
+          <a:prstGeom prst="rect">
+            <a:avLst/>
+          </a:prstGeom>
+          <a:noFill/>
+        </p:spPr>
+        <p:txBody>
+          <a:bodyPr wrap="square" rtlCol="0">
+            <a:spAutoFit/>
+          </a:bodyPr>
+          <a:lstStyle/>
+          <a:p>
+            <a:r>
+              <a:rPr lang="en-US" sz="2400" dirty="0">
+                <a:latin typeface="Aileron SemiBold" panose="00000700000000000000" pitchFamily="50" charset="0"/>
+              </a:rPr>
+              <a:t>"Analyzing workplace injury trends and patterns to uncover key insights that can guide the development of effective safety initiatives, enhance workplace conditions, and reduce the risk of severe incidents across industries."</a:t>
+            </a:r>
+          </a:p>
+        </p:txBody>
+      </p:sp>
+      <p:pic>
+        <p:nvPicPr>
+          <p:cNvPr id="2051" name="Picture 3">
+            <a:extLst>
+              <a:ext uri="{FF2B5EF4-FFF2-40B4-BE49-F238E27FC236}">
+                <a16:creationId xmlns:a16="http://schemas.microsoft.com/office/drawing/2014/main" id="{AB33F116-EB4C-4227-BE0C-5675A54C5278}"/>
+              </a:ext>
+            </a:extLst>
+          </p:cNvPr>
+          <p:cNvPicPr>
+            <a:picLocks noChangeAspect="1" noChangeArrowheads="1"/>
+          </p:cNvPicPr>
+          <p:nvPr/>
+        </p:nvPicPr>
+        <p:blipFill rotWithShape="1">
+          <a:blip r:embed="rId2">
+            <a:extLst>
+              <a:ext uri="{28A0092B-C50C-407E-A947-70E740481C1C}">
+                <a14:useLocalDpi xmlns:a14="http://schemas.microsoft.com/office/drawing/2010/main" val="0"/>
+              </a:ext>
+            </a:extLst>
+          </a:blip>
+          <a:srcRect l="87629" t="472" r="1790"/>
+          <a:stretch/>
+        </p:blipFill>
+        <p:spPr bwMode="auto">
+          <a:xfrm rot="16200000">
+            <a:off x="4951210" y="-382795"/>
+            <a:ext cx="2289586" cy="12192003"/>
+          </a:xfrm>
+          <a:prstGeom prst="rect">
+            <a:avLst/>
+          </a:prstGeom>
+          <a:noFill/>
+          <a:extLst>
+            <a:ext uri="{909E8E84-426E-40DD-AFC4-6F175D3DCCD1}">
+              <a14:hiddenFill xmlns:a14="http://schemas.microsoft.com/office/drawing/2010/main">
+                <a:solidFill>
+                  <a:srgbClr val="FFFFFF"/>
+                </a:solidFill>
+              </a14:hiddenFill>
+            </a:ext>
+          </a:extLst>
+        </p:spPr>
+      </p:pic>
+      <p:sp>
+        <p:nvSpPr>
+          <p:cNvPr id="8" name="TextBox 7">
+            <a:extLst>
+              <a:ext uri="{FF2B5EF4-FFF2-40B4-BE49-F238E27FC236}">
+                <a16:creationId xmlns:a16="http://schemas.microsoft.com/office/drawing/2014/main" id="{B91977C4-A4AF-474C-8E71-A3CD7F5526CE}"/>
+              </a:ext>
+            </a:extLst>
+          </p:cNvPr>
+          <p:cNvSpPr txBox="1"/>
+          <p:nvPr/>
+        </p:nvSpPr>
+        <p:spPr>
+          <a:xfrm>
+            <a:off x="8266654" y="2656870"/>
+            <a:ext cx="1908586" cy="461665"/>
+          </a:xfrm>
+          <a:prstGeom prst="rect">
+            <a:avLst/>
+          </a:prstGeom>
+          <a:noFill/>
+        </p:spPr>
+        <p:txBody>
+          <a:bodyPr wrap="square">
+            <a:spAutoFit/>
+          </a:bodyPr>
+          <a:lstStyle/>
+          <a:p>
+            <a:r>
+              <a:rPr lang="en-US" sz="2400" b="1" u="sng" dirty="0">
+                <a:solidFill>
+                  <a:srgbClr val="FF0000"/>
+                </a:solidFill>
+                <a:latin typeface="Aileron SemiBold" panose="00000700000000000000" pitchFamily="50" charset="0"/>
+              </a:rPr>
+              <a:t>uncover key </a:t>
+            </a:r>
+            <a:endParaRPr lang="en-US" sz="2400" b="1" u="sng" dirty="0">
+              <a:solidFill>
+                <a:srgbClr val="FF0000"/>
+              </a:solidFill>
+            </a:endParaRPr>
+          </a:p>
+        </p:txBody>
+      </p:sp>
+      <p:sp>
+        <p:nvSpPr>
+          <p:cNvPr id="10" name="TextBox 9">
+            <a:extLst>
+              <a:ext uri="{FF2B5EF4-FFF2-40B4-BE49-F238E27FC236}">
+                <a16:creationId xmlns:a16="http://schemas.microsoft.com/office/drawing/2014/main" id="{DDB37D31-D8D4-4649-934E-A96EAA13CC13}"/>
+              </a:ext>
+            </a:extLst>
+          </p:cNvPr>
+          <p:cNvSpPr txBox="1"/>
+          <p:nvPr/>
+        </p:nvSpPr>
+        <p:spPr>
+          <a:xfrm>
+            <a:off x="1163320" y="3020216"/>
+            <a:ext cx="1290918" cy="461665"/>
+          </a:xfrm>
+          <a:prstGeom prst="rect">
+            <a:avLst/>
+          </a:prstGeom>
+          <a:noFill/>
+        </p:spPr>
+        <p:txBody>
+          <a:bodyPr wrap="square">
+            <a:spAutoFit/>
+          </a:bodyPr>
+          <a:lstStyle/>
+          <a:p>
+            <a:r>
+              <a:rPr lang="en-US" sz="2400" u="sng" dirty="0">
+                <a:solidFill>
+                  <a:srgbClr val="FF0000"/>
+                </a:solidFill>
+                <a:latin typeface="Aileron SemiBold" panose="00000700000000000000" pitchFamily="50" charset="0"/>
+              </a:rPr>
+              <a:t>insights</a:t>
+            </a:r>
+            <a:endParaRPr lang="en-US" sz="2400" u="sng" dirty="0">
+              <a:solidFill>
+                <a:srgbClr val="FF0000"/>
+              </a:solidFill>
+            </a:endParaRPr>
+          </a:p>
+        </p:txBody>
+      </p:sp>
+      <p:sp>
+        <p:nvSpPr>
+          <p:cNvPr id="12" name="TextBox 11">
+            <a:extLst>
+              <a:ext uri="{FF2B5EF4-FFF2-40B4-BE49-F238E27FC236}">
+                <a16:creationId xmlns:a16="http://schemas.microsoft.com/office/drawing/2014/main" id="{888BF1C9-E168-4589-9EA8-60A5BD9BE75A}"/>
+              </a:ext>
+            </a:extLst>
+          </p:cNvPr>
+          <p:cNvSpPr txBox="1"/>
+          <p:nvPr/>
+        </p:nvSpPr>
+        <p:spPr>
+          <a:xfrm>
+            <a:off x="8479118" y="3019280"/>
+            <a:ext cx="2500745" cy="461665"/>
+          </a:xfrm>
+          <a:prstGeom prst="rect">
+            <a:avLst/>
+          </a:prstGeom>
+          <a:noFill/>
+        </p:spPr>
+        <p:txBody>
+          <a:bodyPr wrap="square">
+            <a:spAutoFit/>
+          </a:bodyPr>
+          <a:lstStyle/>
+          <a:p>
+            <a:r>
+              <a:rPr lang="en-US" sz="2400" u="sng" dirty="0">
+                <a:solidFill>
+                  <a:srgbClr val="FF0000"/>
+                </a:solidFill>
+                <a:latin typeface="Aileron SemiBold" panose="00000700000000000000" pitchFamily="50" charset="0"/>
+              </a:rPr>
+              <a:t>safety initiatives</a:t>
+            </a:r>
+            <a:endParaRPr lang="en-US" sz="2400" u="sng" dirty="0">
+              <a:solidFill>
+                <a:srgbClr val="FF0000"/>
+              </a:solidFill>
+            </a:endParaRPr>
+          </a:p>
+        </p:txBody>
+      </p:sp>
+      <p:sp>
+        <p:nvSpPr>
+          <p:cNvPr id="14" name="TextBox 13">
+            <a:extLst>
+              <a:ext uri="{FF2B5EF4-FFF2-40B4-BE49-F238E27FC236}">
+                <a16:creationId xmlns:a16="http://schemas.microsoft.com/office/drawing/2014/main" id="{45880029-DBA7-4C87-AF71-21A4A30094FF}"/>
+              </a:ext>
+            </a:extLst>
+          </p:cNvPr>
+          <p:cNvSpPr txBox="1"/>
+          <p:nvPr/>
+        </p:nvSpPr>
+        <p:spPr>
+          <a:xfrm>
+            <a:off x="6228978" y="3385722"/>
+            <a:ext cx="2277035" cy="461665"/>
+          </a:xfrm>
+          <a:prstGeom prst="rect">
+            <a:avLst/>
+          </a:prstGeom>
+          <a:noFill/>
+        </p:spPr>
+        <p:txBody>
+          <a:bodyPr wrap="square">
+            <a:spAutoFit/>
+          </a:bodyPr>
+          <a:lstStyle/>
+          <a:p>
+            <a:r>
+              <a:rPr lang="en-US" sz="2400" u="sng" dirty="0">
+                <a:solidFill>
+                  <a:srgbClr val="FF0000"/>
+                </a:solidFill>
+                <a:latin typeface="Aileron SemiBold" panose="00000700000000000000" pitchFamily="50" charset="0"/>
+              </a:rPr>
+              <a:t>reduce the risk </a:t>
+            </a:r>
+            <a:endParaRPr lang="en-US" sz="2400" u="sng" dirty="0">
+              <a:solidFill>
+                <a:srgbClr val="FF0000"/>
+              </a:solidFill>
+            </a:endParaRPr>
+          </a:p>
+        </p:txBody>
+      </p:sp>
+    </p:spTree>
+    <p:extLst>
+      <p:ext uri="{BB962C8B-B14F-4D97-AF65-F5344CB8AC3E}">
         <p14:creationId xmlns:p14="http://schemas.microsoft.com/office/powerpoint/2010/main" val="593026812"/>
       </p:ext>
     </p:extLst>
@@ -4253,6 +5325,253 @@
   <p:clrMapOvr>
     <a:masterClrMapping/>
   </p:clrMapOvr>
+  <p:timing>
+    <p:tnLst>
+      <p:par>
+        <p:cTn id="1" dur="indefinite" restart="never" nodeType="tmRoot">
+          <p:childTnLst>
+            <p:seq concurrent="1" nextAc="seek">
+              <p:cTn id="2" dur="indefinite" nodeType="mainSeq">
+                <p:childTnLst>
+                  <p:par>
+                    <p:cTn id="3" fill="hold">
+                      <p:stCondLst>
+                        <p:cond delay="indefinite"/>
+                      </p:stCondLst>
+                      <p:childTnLst>
+                        <p:par>
+                          <p:cTn id="4" fill="hold">
+                            <p:stCondLst>
+                              <p:cond delay="0"/>
+                            </p:stCondLst>
+                            <p:childTnLst>
+                              <p:par>
+                                <p:cTn id="5" presetID="1" presetClass="entr" presetSubtype="0" fill="hold" nodeType="clickEffect">
+                                  <p:stCondLst>
+                                    <p:cond delay="0"/>
+                                  </p:stCondLst>
+                                  <p:childTnLst>
+                                    <p:set>
+                                      <p:cBhvr>
+                                        <p:cTn id="6" dur="1" fill="hold">
+                                          <p:stCondLst>
+                                            <p:cond delay="0"/>
+                                          </p:stCondLst>
+                                        </p:cTn>
+                                        <p:tgtEl>
+                                          <p:spTgt spid="5">
+                                            <p:txEl>
+                                              <p:pRg st="0" end="0"/>
+                                            </p:txEl>
+                                          </p:spTgt>
+                                        </p:tgtEl>
+                                        <p:attrNameLst>
+                                          <p:attrName>style.visibility</p:attrName>
+                                        </p:attrNameLst>
+                                      </p:cBhvr>
+                                      <p:to>
+                                        <p:strVal val="visible"/>
+                                      </p:to>
+                                    </p:set>
+                                  </p:childTnLst>
+                                </p:cTn>
+                              </p:par>
+                            </p:childTnLst>
+                          </p:cTn>
+                        </p:par>
+                      </p:childTnLst>
+                    </p:cTn>
+                  </p:par>
+                  <p:par>
+                    <p:cTn id="7" fill="hold">
+                      <p:stCondLst>
+                        <p:cond delay="indefinite"/>
+                      </p:stCondLst>
+                      <p:childTnLst>
+                        <p:par>
+                          <p:cTn id="8" fill="hold">
+                            <p:stCondLst>
+                              <p:cond delay="0"/>
+                            </p:stCondLst>
+                            <p:childTnLst>
+                              <p:par>
+                                <p:cTn id="9" presetID="1" presetClass="entr" presetSubtype="0" fill="hold" grpId="0" nodeType="clickEffect">
+                                  <p:stCondLst>
+                                    <p:cond delay="0"/>
+                                  </p:stCondLst>
+                                  <p:childTnLst>
+                                    <p:set>
+                                      <p:cBhvr>
+                                        <p:cTn id="10" dur="1" fill="hold">
+                                          <p:stCondLst>
+                                            <p:cond delay="0"/>
+                                          </p:stCondLst>
+                                        </p:cTn>
+                                        <p:tgtEl>
+                                          <p:spTgt spid="8"/>
+                                        </p:tgtEl>
+                                        <p:attrNameLst>
+                                          <p:attrName>style.visibility</p:attrName>
+                                        </p:attrNameLst>
+                                      </p:cBhvr>
+                                      <p:to>
+                                        <p:strVal val="visible"/>
+                                      </p:to>
+                                    </p:set>
+                                  </p:childTnLst>
+                                </p:cTn>
+                              </p:par>
+                              <p:par>
+                                <p:cTn id="11" presetID="1" presetClass="entr" presetSubtype="0" fill="hold" grpId="0" nodeType="withEffect">
+                                  <p:stCondLst>
+                                    <p:cond delay="0"/>
+                                  </p:stCondLst>
+                                  <p:childTnLst>
+                                    <p:set>
+                                      <p:cBhvr>
+                                        <p:cTn id="12" dur="1" fill="hold">
+                                          <p:stCondLst>
+                                            <p:cond delay="0"/>
+                                          </p:stCondLst>
+                                        </p:cTn>
+                                        <p:tgtEl>
+                                          <p:spTgt spid="10"/>
+                                        </p:tgtEl>
+                                        <p:attrNameLst>
+                                          <p:attrName>style.visibility</p:attrName>
+                                        </p:attrNameLst>
+                                      </p:cBhvr>
+                                      <p:to>
+                                        <p:strVal val="visible"/>
+                                      </p:to>
+                                    </p:set>
+                                  </p:childTnLst>
+                                </p:cTn>
+                              </p:par>
+                            </p:childTnLst>
+                          </p:cTn>
+                        </p:par>
+                      </p:childTnLst>
+                    </p:cTn>
+                  </p:par>
+                  <p:par>
+                    <p:cTn id="13" fill="hold">
+                      <p:stCondLst>
+                        <p:cond delay="indefinite"/>
+                      </p:stCondLst>
+                      <p:childTnLst>
+                        <p:par>
+                          <p:cTn id="14" fill="hold">
+                            <p:stCondLst>
+                              <p:cond delay="0"/>
+                            </p:stCondLst>
+                            <p:childTnLst>
+                              <p:par>
+                                <p:cTn id="15" presetID="1" presetClass="entr" presetSubtype="0" fill="hold" grpId="0" nodeType="clickEffect">
+                                  <p:stCondLst>
+                                    <p:cond delay="0"/>
+                                  </p:stCondLst>
+                                  <p:childTnLst>
+                                    <p:set>
+                                      <p:cBhvr>
+                                        <p:cTn id="16" dur="1" fill="hold">
+                                          <p:stCondLst>
+                                            <p:cond delay="0"/>
+                                          </p:stCondLst>
+                                        </p:cTn>
+                                        <p:tgtEl>
+                                          <p:spTgt spid="12"/>
+                                        </p:tgtEl>
+                                        <p:attrNameLst>
+                                          <p:attrName>style.visibility</p:attrName>
+                                        </p:attrNameLst>
+                                      </p:cBhvr>
+                                      <p:to>
+                                        <p:strVal val="visible"/>
+                                      </p:to>
+                                    </p:set>
+                                  </p:childTnLst>
+                                </p:cTn>
+                              </p:par>
+                            </p:childTnLst>
+                          </p:cTn>
+                        </p:par>
+                      </p:childTnLst>
+                    </p:cTn>
+                  </p:par>
+                  <p:par>
+                    <p:cTn id="17" fill="hold">
+                      <p:stCondLst>
+                        <p:cond delay="indefinite"/>
+                      </p:stCondLst>
+                      <p:childTnLst>
+                        <p:par>
+                          <p:cTn id="18" fill="hold">
+                            <p:stCondLst>
+                              <p:cond delay="0"/>
+                            </p:stCondLst>
+                            <p:childTnLst>
+                              <p:par>
+                                <p:cTn id="19" presetID="1" presetClass="entr" presetSubtype="0" fill="hold" grpId="0" nodeType="clickEffect">
+                                  <p:stCondLst>
+                                    <p:cond delay="0"/>
+                                  </p:stCondLst>
+                                  <p:childTnLst>
+                                    <p:set>
+                                      <p:cBhvr>
+                                        <p:cTn id="20" dur="1" fill="hold">
+                                          <p:stCondLst>
+                                            <p:cond delay="0"/>
+                                          </p:stCondLst>
+                                        </p:cTn>
+                                        <p:tgtEl>
+                                          <p:spTgt spid="14"/>
+                                        </p:tgtEl>
+                                        <p:attrNameLst>
+                                          <p:attrName>style.visibility</p:attrName>
+                                        </p:attrNameLst>
+                                      </p:cBhvr>
+                                      <p:to>
+                                        <p:strVal val="visible"/>
+                                      </p:to>
+                                    </p:set>
+                                  </p:childTnLst>
+                                </p:cTn>
+                              </p:par>
+                            </p:childTnLst>
+                          </p:cTn>
+                        </p:par>
+                      </p:childTnLst>
+                    </p:cTn>
+                  </p:par>
+                </p:childTnLst>
+              </p:cTn>
+              <p:prevCondLst>
+                <p:cond evt="onPrev" delay="0">
+                  <p:tgtEl>
+                    <p:sldTgt/>
+                  </p:tgtEl>
+                </p:cond>
+              </p:prevCondLst>
+              <p:nextCondLst>
+                <p:cond evt="onNext" delay="0">
+                  <p:tgtEl>
+                    <p:sldTgt/>
+                  </p:tgtEl>
+                </p:cond>
+              </p:nextCondLst>
+            </p:seq>
+          </p:childTnLst>
+        </p:cTn>
+      </p:par>
+    </p:tnLst>
+    <p:bldLst>
+      <p:bldP spid="8" grpId="0"/>
+      <p:bldP spid="10" grpId="0"/>
+      <p:bldP spid="12" grpId="0"/>
+      <p:bldP spid="14" grpId="0"/>
+    </p:bldLst>
+  </p:timing>
 </p:sld>
 </file>
 
@@ -4410,6 +5729,331 @@
           </a:extLst>
         </p:spPr>
       </p:pic>
+      <p:sp>
+        <p:nvSpPr>
+          <p:cNvPr id="2" name="Rectangle 1">
+            <a:extLst>
+              <a:ext uri="{FF2B5EF4-FFF2-40B4-BE49-F238E27FC236}">
+                <a16:creationId xmlns:a16="http://schemas.microsoft.com/office/drawing/2014/main" id="{B54436C6-B6DD-4908-9E6F-5F06C1132B5E}"/>
+              </a:ext>
+            </a:extLst>
+          </p:cNvPr>
+          <p:cNvSpPr/>
+          <p:nvPr/>
+        </p:nvSpPr>
+        <p:spPr>
+          <a:xfrm>
+            <a:off x="10172700" y="4676775"/>
+            <a:ext cx="657225" cy="638175"/>
+          </a:xfrm>
+          <a:prstGeom prst="rect">
+            <a:avLst/>
+          </a:prstGeom>
+          <a:noFill/>
+          <a:ln w="76200">
+            <a:solidFill>
+              <a:srgbClr val="FF0000"/>
+            </a:solidFill>
+          </a:ln>
+        </p:spPr>
+        <p:style>
+          <a:lnRef idx="2">
+            <a:schemeClr val="accent1">
+              <a:shade val="50000"/>
+            </a:schemeClr>
+          </a:lnRef>
+          <a:fillRef idx="1">
+            <a:schemeClr val="accent1"/>
+          </a:fillRef>
+          <a:effectRef idx="0">
+            <a:schemeClr val="accent1"/>
+          </a:effectRef>
+          <a:fontRef idx="minor">
+            <a:schemeClr val="lt1"/>
+          </a:fontRef>
+        </p:style>
+        <p:txBody>
+          <a:bodyPr rtlCol="0" anchor="ctr"/>
+          <a:lstStyle/>
+          <a:p>
+            <a:pPr algn="ctr"/>
+            <a:endParaRPr lang="en-US"/>
+          </a:p>
+        </p:txBody>
+      </p:sp>
+      <p:sp>
+        <p:nvSpPr>
+          <p:cNvPr id="5" name="Arrow: Right 4">
+            <a:extLst>
+              <a:ext uri="{FF2B5EF4-FFF2-40B4-BE49-F238E27FC236}">
+                <a16:creationId xmlns:a16="http://schemas.microsoft.com/office/drawing/2014/main" id="{F37BDC6E-9281-4255-807F-279BF3497F07}"/>
+              </a:ext>
+            </a:extLst>
+          </p:cNvPr>
+          <p:cNvSpPr/>
+          <p:nvPr/>
+        </p:nvSpPr>
+        <p:spPr>
+          <a:xfrm>
+            <a:off x="332695" y="4048125"/>
+            <a:ext cx="1047750" cy="485775"/>
+          </a:xfrm>
+          <a:prstGeom prst="rightArrow">
+            <a:avLst/>
+          </a:prstGeom>
+          <a:solidFill>
+            <a:schemeClr val="accent5">
+              <a:lumMod val="75000"/>
+            </a:schemeClr>
+          </a:solidFill>
+          <a:ln>
+            <a:noFill/>
+          </a:ln>
+        </p:spPr>
+        <p:style>
+          <a:lnRef idx="2">
+            <a:schemeClr val="accent1">
+              <a:shade val="50000"/>
+            </a:schemeClr>
+          </a:lnRef>
+          <a:fillRef idx="1">
+            <a:schemeClr val="accent1"/>
+          </a:fillRef>
+          <a:effectRef idx="0">
+            <a:schemeClr val="accent1"/>
+          </a:effectRef>
+          <a:fontRef idx="minor">
+            <a:schemeClr val="lt1"/>
+          </a:fontRef>
+        </p:style>
+        <p:txBody>
+          <a:bodyPr rtlCol="0" anchor="ctr"/>
+          <a:lstStyle/>
+          <a:p>
+            <a:pPr algn="ctr"/>
+            <a:endParaRPr lang="en-US"/>
+          </a:p>
+        </p:txBody>
+      </p:sp>
+      <p:sp>
+        <p:nvSpPr>
+          <p:cNvPr id="7" name="Arrow: Right 6">
+            <a:extLst>
+              <a:ext uri="{FF2B5EF4-FFF2-40B4-BE49-F238E27FC236}">
+                <a16:creationId xmlns:a16="http://schemas.microsoft.com/office/drawing/2014/main" id="{6457922E-1714-4A42-BFBC-54ED47E76975}"/>
+              </a:ext>
+            </a:extLst>
+          </p:cNvPr>
+          <p:cNvSpPr/>
+          <p:nvPr/>
+        </p:nvSpPr>
+        <p:spPr>
+          <a:xfrm>
+            <a:off x="802252" y="2511819"/>
+            <a:ext cx="1047750" cy="485775"/>
+          </a:xfrm>
+          <a:prstGeom prst="rightArrow">
+            <a:avLst/>
+          </a:prstGeom>
+          <a:solidFill>
+            <a:schemeClr val="accent1">
+              <a:lumMod val="60000"/>
+              <a:lumOff val="40000"/>
+            </a:schemeClr>
+          </a:solidFill>
+          <a:ln>
+            <a:noFill/>
+          </a:ln>
+        </p:spPr>
+        <p:style>
+          <a:lnRef idx="2">
+            <a:schemeClr val="accent1">
+              <a:shade val="50000"/>
+            </a:schemeClr>
+          </a:lnRef>
+          <a:fillRef idx="1">
+            <a:schemeClr val="accent1"/>
+          </a:fillRef>
+          <a:effectRef idx="0">
+            <a:schemeClr val="accent1"/>
+          </a:effectRef>
+          <a:fontRef idx="minor">
+            <a:schemeClr val="lt1"/>
+          </a:fontRef>
+        </p:style>
+        <p:txBody>
+          <a:bodyPr rtlCol="0" anchor="ctr"/>
+          <a:lstStyle/>
+          <a:p>
+            <a:pPr algn="ctr"/>
+            <a:endParaRPr lang="en-US"/>
+          </a:p>
+        </p:txBody>
+      </p:sp>
+      <p:sp>
+        <p:nvSpPr>
+          <p:cNvPr id="8" name="Arrow: Right 7">
+            <a:extLst>
+              <a:ext uri="{FF2B5EF4-FFF2-40B4-BE49-F238E27FC236}">
+                <a16:creationId xmlns:a16="http://schemas.microsoft.com/office/drawing/2014/main" id="{461B9FE7-BDDD-4889-BB8D-256717BB4DCE}"/>
+              </a:ext>
+            </a:extLst>
+          </p:cNvPr>
+          <p:cNvSpPr/>
+          <p:nvPr/>
+        </p:nvSpPr>
+        <p:spPr>
+          <a:xfrm>
+            <a:off x="684214" y="3284271"/>
+            <a:ext cx="1047750" cy="485775"/>
+          </a:xfrm>
+          <a:prstGeom prst="rightArrow">
+            <a:avLst/>
+          </a:prstGeom>
+          <a:solidFill>
+            <a:schemeClr val="tx2">
+              <a:lumMod val="60000"/>
+              <a:lumOff val="40000"/>
+            </a:schemeClr>
+          </a:solidFill>
+          <a:ln>
+            <a:noFill/>
+          </a:ln>
+        </p:spPr>
+        <p:style>
+          <a:lnRef idx="2">
+            <a:schemeClr val="accent1">
+              <a:shade val="50000"/>
+            </a:schemeClr>
+          </a:lnRef>
+          <a:fillRef idx="1">
+            <a:schemeClr val="accent1"/>
+          </a:fillRef>
+          <a:effectRef idx="0">
+            <a:schemeClr val="accent1"/>
+          </a:effectRef>
+          <a:fontRef idx="minor">
+            <a:schemeClr val="lt1"/>
+          </a:fontRef>
+        </p:style>
+        <p:txBody>
+          <a:bodyPr rtlCol="0" anchor="ctr"/>
+          <a:lstStyle/>
+          <a:p>
+            <a:pPr algn="ctr"/>
+            <a:endParaRPr lang="en-US"/>
+          </a:p>
+        </p:txBody>
+      </p:sp>
+      <p:sp>
+        <p:nvSpPr>
+          <p:cNvPr id="9" name="Arrow: Right 8">
+            <a:extLst>
+              <a:ext uri="{FF2B5EF4-FFF2-40B4-BE49-F238E27FC236}">
+                <a16:creationId xmlns:a16="http://schemas.microsoft.com/office/drawing/2014/main" id="{5F80EBC0-64D9-4ADF-905F-3B7495415CF9}"/>
+              </a:ext>
+            </a:extLst>
+          </p:cNvPr>
+          <p:cNvSpPr/>
+          <p:nvPr/>
+        </p:nvSpPr>
+        <p:spPr>
+          <a:xfrm>
+            <a:off x="1581150" y="4829175"/>
+            <a:ext cx="1047750" cy="485775"/>
+          </a:xfrm>
+          <a:prstGeom prst="rightArrow">
+            <a:avLst/>
+          </a:prstGeom>
+          <a:solidFill>
+            <a:schemeClr val="accent1">
+              <a:lumMod val="75000"/>
+            </a:schemeClr>
+          </a:solidFill>
+          <a:ln>
+            <a:noFill/>
+          </a:ln>
+        </p:spPr>
+        <p:style>
+          <a:lnRef idx="2">
+            <a:schemeClr val="accent1">
+              <a:shade val="50000"/>
+            </a:schemeClr>
+          </a:lnRef>
+          <a:fillRef idx="1">
+            <a:schemeClr val="accent1"/>
+          </a:fillRef>
+          <a:effectRef idx="0">
+            <a:schemeClr val="accent1"/>
+          </a:effectRef>
+          <a:fontRef idx="minor">
+            <a:schemeClr val="lt1"/>
+          </a:fontRef>
+        </p:style>
+        <p:txBody>
+          <a:bodyPr rtlCol="0" anchor="ctr"/>
+          <a:lstStyle/>
+          <a:p>
+            <a:pPr algn="ctr"/>
+            <a:endParaRPr lang="en-US"/>
+          </a:p>
+        </p:txBody>
+      </p:sp>
+      <p:sp>
+        <p:nvSpPr>
+          <p:cNvPr id="10" name="Arrow: Right 9">
+            <a:extLst>
+              <a:ext uri="{FF2B5EF4-FFF2-40B4-BE49-F238E27FC236}">
+                <a16:creationId xmlns:a16="http://schemas.microsoft.com/office/drawing/2014/main" id="{428A0084-272D-499D-B53D-0D6D211D885F}"/>
+              </a:ext>
+            </a:extLst>
+          </p:cNvPr>
+          <p:cNvSpPr/>
+          <p:nvPr/>
+        </p:nvSpPr>
+        <p:spPr>
+          <a:xfrm>
+            <a:off x="1208089" y="1771906"/>
+            <a:ext cx="1047750" cy="485775"/>
+          </a:xfrm>
+          <a:prstGeom prst="rightArrow">
+            <a:avLst/>
+          </a:prstGeom>
+          <a:solidFill>
+            <a:schemeClr val="accent5">
+              <a:lumMod val="40000"/>
+              <a:lumOff val="60000"/>
+            </a:schemeClr>
+          </a:solidFill>
+          <a:ln>
+            <a:noFill/>
+          </a:ln>
+        </p:spPr>
+        <p:style>
+          <a:lnRef idx="2">
+            <a:schemeClr val="accent1">
+              <a:shade val="50000"/>
+            </a:schemeClr>
+          </a:lnRef>
+          <a:fillRef idx="1">
+            <a:schemeClr val="accent1"/>
+          </a:fillRef>
+          <a:effectRef idx="0">
+            <a:schemeClr val="accent1"/>
+          </a:effectRef>
+          <a:fontRef idx="minor">
+            <a:schemeClr val="lt1"/>
+          </a:fontRef>
+        </p:style>
+        <p:txBody>
+          <a:bodyPr rtlCol="0" anchor="ctr"/>
+          <a:lstStyle/>
+          <a:p>
+            <a:pPr algn="ctr"/>
+            <a:endParaRPr lang="en-US"/>
+          </a:p>
+        </p:txBody>
+      </p:sp>
     </p:spTree>
     <p:extLst>
       <p:ext uri="{BB962C8B-B14F-4D97-AF65-F5344CB8AC3E}">
@@ -4420,6 +6064,314 @@
   <p:clrMapOvr>
     <a:masterClrMapping/>
   </p:clrMapOvr>
+  <p:timing>
+    <p:tnLst>
+      <p:par>
+        <p:cTn id="1" dur="indefinite" restart="never" nodeType="tmRoot">
+          <p:childTnLst>
+            <p:seq concurrent="1" nextAc="seek">
+              <p:cTn id="2" dur="indefinite" nodeType="mainSeq">
+                <p:childTnLst>
+                  <p:par>
+                    <p:cTn id="3" fill="hold">
+                      <p:stCondLst>
+                        <p:cond delay="indefinite"/>
+                      </p:stCondLst>
+                      <p:childTnLst>
+                        <p:par>
+                          <p:cTn id="4" fill="hold">
+                            <p:stCondLst>
+                              <p:cond delay="0"/>
+                            </p:stCondLst>
+                            <p:childTnLst>
+                              <p:par>
+                                <p:cTn id="5" presetID="1" presetClass="entr" presetSubtype="0" fill="hold" grpId="0" nodeType="clickEffect">
+                                  <p:stCondLst>
+                                    <p:cond delay="0"/>
+                                  </p:stCondLst>
+                                  <p:childTnLst>
+                                    <p:set>
+                                      <p:cBhvr>
+                                        <p:cTn id="6" dur="1" fill="hold">
+                                          <p:stCondLst>
+                                            <p:cond delay="0"/>
+                                          </p:stCondLst>
+                                        </p:cTn>
+                                        <p:tgtEl>
+                                          <p:spTgt spid="9"/>
+                                        </p:tgtEl>
+                                        <p:attrNameLst>
+                                          <p:attrName>style.visibility</p:attrName>
+                                        </p:attrNameLst>
+                                      </p:cBhvr>
+                                      <p:to>
+                                        <p:strVal val="visible"/>
+                                      </p:to>
+                                    </p:set>
+                                  </p:childTnLst>
+                                </p:cTn>
+                              </p:par>
+                            </p:childTnLst>
+                          </p:cTn>
+                        </p:par>
+                      </p:childTnLst>
+                    </p:cTn>
+                  </p:par>
+                  <p:par>
+                    <p:cTn id="7" fill="hold">
+                      <p:stCondLst>
+                        <p:cond delay="indefinite"/>
+                      </p:stCondLst>
+                      <p:childTnLst>
+                        <p:par>
+                          <p:cTn id="8" fill="hold">
+                            <p:stCondLst>
+                              <p:cond delay="0"/>
+                            </p:stCondLst>
+                            <p:childTnLst>
+                              <p:par>
+                                <p:cTn id="9" presetID="1" presetClass="entr" presetSubtype="0" fill="hold" grpId="0" nodeType="clickEffect">
+                                  <p:stCondLst>
+                                    <p:cond delay="0"/>
+                                  </p:stCondLst>
+                                  <p:childTnLst>
+                                    <p:set>
+                                      <p:cBhvr>
+                                        <p:cTn id="10" dur="1" fill="hold">
+                                          <p:stCondLst>
+                                            <p:cond delay="0"/>
+                                          </p:stCondLst>
+                                        </p:cTn>
+                                        <p:tgtEl>
+                                          <p:spTgt spid="2"/>
+                                        </p:tgtEl>
+                                        <p:attrNameLst>
+                                          <p:attrName>style.visibility</p:attrName>
+                                        </p:attrNameLst>
+                                      </p:cBhvr>
+                                      <p:to>
+                                        <p:strVal val="visible"/>
+                                      </p:to>
+                                    </p:set>
+                                  </p:childTnLst>
+                                </p:cTn>
+                              </p:par>
+                            </p:childTnLst>
+                          </p:cTn>
+                        </p:par>
+                      </p:childTnLst>
+                    </p:cTn>
+                  </p:par>
+                  <p:par>
+                    <p:cTn id="11" fill="hold">
+                      <p:stCondLst>
+                        <p:cond delay="indefinite"/>
+                      </p:stCondLst>
+                      <p:childTnLst>
+                        <p:par>
+                          <p:cTn id="12" fill="hold">
+                            <p:stCondLst>
+                              <p:cond delay="0"/>
+                            </p:stCondLst>
+                            <p:childTnLst>
+                              <p:par>
+                                <p:cTn id="13" presetID="1" presetClass="entr" presetSubtype="0" fill="hold" grpId="0" nodeType="clickEffect">
+                                  <p:stCondLst>
+                                    <p:cond delay="0"/>
+                                  </p:stCondLst>
+                                  <p:childTnLst>
+                                    <p:set>
+                                      <p:cBhvr>
+                                        <p:cTn id="14" dur="1" fill="hold">
+                                          <p:stCondLst>
+                                            <p:cond delay="0"/>
+                                          </p:stCondLst>
+                                        </p:cTn>
+                                        <p:tgtEl>
+                                          <p:spTgt spid="5"/>
+                                        </p:tgtEl>
+                                        <p:attrNameLst>
+                                          <p:attrName>style.visibility</p:attrName>
+                                        </p:attrNameLst>
+                                      </p:cBhvr>
+                                      <p:to>
+                                        <p:strVal val="visible"/>
+                                      </p:to>
+                                    </p:set>
+                                  </p:childTnLst>
+                                </p:cTn>
+                              </p:par>
+                            </p:childTnLst>
+                          </p:cTn>
+                        </p:par>
+                      </p:childTnLst>
+                    </p:cTn>
+                  </p:par>
+                  <p:par>
+                    <p:cTn id="15" fill="hold">
+                      <p:stCondLst>
+                        <p:cond delay="indefinite"/>
+                      </p:stCondLst>
+                      <p:childTnLst>
+                        <p:par>
+                          <p:cTn id="16" fill="hold">
+                            <p:stCondLst>
+                              <p:cond delay="0"/>
+                            </p:stCondLst>
+                            <p:childTnLst>
+                              <p:par>
+                                <p:cTn id="17" presetID="1" presetClass="entr" presetSubtype="0" fill="hold" grpId="0" nodeType="clickEffect">
+                                  <p:stCondLst>
+                                    <p:cond delay="0"/>
+                                  </p:stCondLst>
+                                  <p:childTnLst>
+                                    <p:set>
+                                      <p:cBhvr>
+                                        <p:cTn id="18" dur="1" fill="hold">
+                                          <p:stCondLst>
+                                            <p:cond delay="0"/>
+                                          </p:stCondLst>
+                                        </p:cTn>
+                                        <p:tgtEl>
+                                          <p:spTgt spid="8"/>
+                                        </p:tgtEl>
+                                        <p:attrNameLst>
+                                          <p:attrName>style.visibility</p:attrName>
+                                        </p:attrNameLst>
+                                      </p:cBhvr>
+                                      <p:to>
+                                        <p:strVal val="visible"/>
+                                      </p:to>
+                                    </p:set>
+                                  </p:childTnLst>
+                                </p:cTn>
+                              </p:par>
+                            </p:childTnLst>
+                          </p:cTn>
+                        </p:par>
+                      </p:childTnLst>
+                    </p:cTn>
+                  </p:par>
+                  <p:par>
+                    <p:cTn id="19" fill="hold">
+                      <p:stCondLst>
+                        <p:cond delay="indefinite"/>
+                      </p:stCondLst>
+                      <p:childTnLst>
+                        <p:par>
+                          <p:cTn id="20" fill="hold">
+                            <p:stCondLst>
+                              <p:cond delay="0"/>
+                            </p:stCondLst>
+                            <p:childTnLst>
+                              <p:par>
+                                <p:cTn id="21" presetID="1" presetClass="entr" presetSubtype="0" fill="hold" grpId="0" nodeType="clickEffect">
+                                  <p:stCondLst>
+                                    <p:cond delay="0"/>
+                                  </p:stCondLst>
+                                  <p:childTnLst>
+                                    <p:set>
+                                      <p:cBhvr>
+                                        <p:cTn id="22" dur="1" fill="hold">
+                                          <p:stCondLst>
+                                            <p:cond delay="0"/>
+                                          </p:stCondLst>
+                                        </p:cTn>
+                                        <p:tgtEl>
+                                          <p:spTgt spid="7"/>
+                                        </p:tgtEl>
+                                        <p:attrNameLst>
+                                          <p:attrName>style.visibility</p:attrName>
+                                        </p:attrNameLst>
+                                      </p:cBhvr>
+                                      <p:to>
+                                        <p:strVal val="visible"/>
+                                      </p:to>
+                                    </p:set>
+                                  </p:childTnLst>
+                                </p:cTn>
+                              </p:par>
+                            </p:childTnLst>
+                          </p:cTn>
+                        </p:par>
+                      </p:childTnLst>
+                    </p:cTn>
+                  </p:par>
+                  <p:par>
+                    <p:cTn id="23" fill="hold">
+                      <p:stCondLst>
+                        <p:cond delay="indefinite"/>
+                      </p:stCondLst>
+                      <p:childTnLst>
+                        <p:par>
+                          <p:cTn id="24" fill="hold">
+                            <p:stCondLst>
+                              <p:cond delay="0"/>
+                            </p:stCondLst>
+                            <p:childTnLst>
+                              <p:par>
+                                <p:cTn id="25" presetID="1" presetClass="entr" presetSubtype="0" fill="hold" grpId="0" nodeType="clickEffect">
+                                  <p:stCondLst>
+                                    <p:cond delay="0"/>
+                                  </p:stCondLst>
+                                  <p:childTnLst>
+                                    <p:set>
+                                      <p:cBhvr>
+                                        <p:cTn id="26" dur="1" fill="hold">
+                                          <p:stCondLst>
+                                            <p:cond delay="0"/>
+                                          </p:stCondLst>
+                                        </p:cTn>
+                                        <p:tgtEl>
+                                          <p:spTgt spid="10"/>
+                                        </p:tgtEl>
+                                        <p:attrNameLst>
+                                          <p:attrName>style.visibility</p:attrName>
+                                        </p:attrNameLst>
+                                      </p:cBhvr>
+                                      <p:to>
+                                        <p:strVal val="visible"/>
+                                      </p:to>
+                                    </p:set>
+                                  </p:childTnLst>
+                                </p:cTn>
+                              </p:par>
+                            </p:childTnLst>
+                          </p:cTn>
+                        </p:par>
+                      </p:childTnLst>
+                    </p:cTn>
+                  </p:par>
+                </p:childTnLst>
+              </p:cTn>
+              <p:prevCondLst>
+                <p:cond evt="onPrev" delay="0">
+                  <p:tgtEl>
+                    <p:sldTgt/>
+                  </p:tgtEl>
+                </p:cond>
+              </p:prevCondLst>
+              <p:nextCondLst>
+                <p:cond evt="onNext" delay="0">
+                  <p:tgtEl>
+                    <p:sldTgt/>
+                  </p:tgtEl>
+                </p:cond>
+              </p:nextCondLst>
+            </p:seq>
+          </p:childTnLst>
+        </p:cTn>
+      </p:par>
+    </p:tnLst>
+    <p:bldLst>
+      <p:bldP spid="2" grpId="0" animBg="1"/>
+      <p:bldP spid="5" grpId="0" animBg="1"/>
+      <p:bldP spid="7" grpId="0" animBg="1"/>
+      <p:bldP spid="8" grpId="0" animBg="1"/>
+      <p:bldP spid="9" grpId="0" animBg="1"/>
+      <p:bldP spid="10" grpId="0" animBg="1"/>
+    </p:bldLst>
+  </p:timing>
 </p:sld>
 </file>
 
@@ -4577,6 +6529,58 @@
           </a:extLst>
         </p:spPr>
       </p:pic>
+      <p:sp>
+        <p:nvSpPr>
+          <p:cNvPr id="2" name="Arrow: Down 1">
+            <a:extLst>
+              <a:ext uri="{FF2B5EF4-FFF2-40B4-BE49-F238E27FC236}">
+                <a16:creationId xmlns:a16="http://schemas.microsoft.com/office/drawing/2014/main" id="{8C59EC4E-6F2D-4F0C-B98C-13E4FB6D57AA}"/>
+              </a:ext>
+            </a:extLst>
+          </p:cNvPr>
+          <p:cNvSpPr/>
+          <p:nvPr/>
+        </p:nvSpPr>
+        <p:spPr>
+          <a:xfrm>
+            <a:off x="3181350" y="762000"/>
+            <a:ext cx="485775" cy="695325"/>
+          </a:xfrm>
+          <a:prstGeom prst="downArrow">
+            <a:avLst/>
+          </a:prstGeom>
+          <a:solidFill>
+            <a:srgbClr val="0070C0"/>
+          </a:solidFill>
+          <a:ln>
+            <a:noFill/>
+          </a:ln>
+        </p:spPr>
+        <p:style>
+          <a:lnRef idx="2">
+            <a:schemeClr val="accent1">
+              <a:shade val="50000"/>
+            </a:schemeClr>
+          </a:lnRef>
+          <a:fillRef idx="1">
+            <a:schemeClr val="accent1"/>
+          </a:fillRef>
+          <a:effectRef idx="0">
+            <a:schemeClr val="accent1"/>
+          </a:effectRef>
+          <a:fontRef idx="minor">
+            <a:schemeClr val="lt1"/>
+          </a:fontRef>
+        </p:style>
+        <p:txBody>
+          <a:bodyPr rtlCol="0" anchor="ctr"/>
+          <a:lstStyle/>
+          <a:p>
+            <a:pPr algn="ctr"/>
+            <a:endParaRPr lang="en-US"/>
+          </a:p>
+        </p:txBody>
+      </p:sp>
     </p:spTree>
     <p:extLst>
       <p:ext uri="{BB962C8B-B14F-4D97-AF65-F5344CB8AC3E}">
@@ -4587,6 +6591,84 @@
   <p:clrMapOvr>
     <a:masterClrMapping/>
   </p:clrMapOvr>
+  <p:timing>
+    <p:tnLst>
+      <p:par>
+        <p:cTn id="1" dur="indefinite" restart="never" nodeType="tmRoot">
+          <p:childTnLst>
+            <p:seq concurrent="1" nextAc="seek">
+              <p:cTn id="2" dur="indefinite" nodeType="mainSeq">
+                <p:childTnLst>
+                  <p:par>
+                    <p:cTn id="3" fill="hold">
+                      <p:stCondLst>
+                        <p:cond delay="indefinite"/>
+                      </p:stCondLst>
+                      <p:childTnLst>
+                        <p:par>
+                          <p:cTn id="4" fill="hold">
+                            <p:stCondLst>
+                              <p:cond delay="0"/>
+                            </p:stCondLst>
+                            <p:childTnLst>
+                              <p:par>
+                                <p:cTn id="5" presetID="1" presetClass="entr" presetSubtype="0" fill="hold" grpId="0" nodeType="clickEffect">
+                                  <p:stCondLst>
+                                    <p:cond delay="0"/>
+                                  </p:stCondLst>
+                                  <p:childTnLst>
+                                    <p:set>
+                                      <p:cBhvr>
+                                        <p:cTn id="6" dur="1" fill="hold">
+                                          <p:stCondLst>
+                                            <p:cond delay="0"/>
+                                          </p:stCondLst>
+                                        </p:cTn>
+                                        <p:tgtEl>
+                                          <p:spTgt spid="2"/>
+                                        </p:tgtEl>
+                                        <p:attrNameLst>
+                                          <p:attrName>style.visibility</p:attrName>
+                                        </p:attrNameLst>
+                                      </p:cBhvr>
+                                      <p:to>
+                                        <p:strVal val="visible"/>
+                                      </p:to>
+                                    </p:set>
+                                  </p:childTnLst>
+                                </p:cTn>
+                              </p:par>
+                            </p:childTnLst>
+                          </p:cTn>
+                        </p:par>
+                      </p:childTnLst>
+                    </p:cTn>
+                  </p:par>
+                </p:childTnLst>
+              </p:cTn>
+              <p:prevCondLst>
+                <p:cond evt="onPrev" delay="0">
+                  <p:tgtEl>
+                    <p:sldTgt/>
+                  </p:tgtEl>
+                </p:cond>
+              </p:prevCondLst>
+              <p:nextCondLst>
+                <p:cond evt="onNext" delay="0">
+                  <p:tgtEl>
+                    <p:sldTgt/>
+                  </p:tgtEl>
+                </p:cond>
+              </p:nextCondLst>
+            </p:seq>
+          </p:childTnLst>
+        </p:cTn>
+      </p:par>
+    </p:tnLst>
+    <p:bldLst>
+      <p:bldP spid="2" grpId="0" animBg="1"/>
+    </p:bldLst>
+  </p:timing>
 </p:sld>
 </file>
 
@@ -4744,6 +6826,62 @@
           </a:extLst>
         </p:spPr>
       </p:pic>
+      <p:sp>
+        <p:nvSpPr>
+          <p:cNvPr id="2" name="Oval 1">
+            <a:extLst>
+              <a:ext uri="{FF2B5EF4-FFF2-40B4-BE49-F238E27FC236}">
+                <a16:creationId xmlns:a16="http://schemas.microsoft.com/office/drawing/2014/main" id="{25F7A6C6-90D5-4DC3-820B-EDE85106B51C}"/>
+              </a:ext>
+            </a:extLst>
+          </p:cNvPr>
+          <p:cNvSpPr/>
+          <p:nvPr/>
+        </p:nvSpPr>
+        <p:spPr>
+          <a:xfrm>
+            <a:off x="4494527" y="4257675"/>
+            <a:ext cx="1257300" cy="695325"/>
+          </a:xfrm>
+          <a:prstGeom prst="ellipse">
+            <a:avLst/>
+          </a:prstGeom>
+          <a:noFill/>
+          <a:ln w="76200">
+            <a:solidFill>
+              <a:srgbClr val="3C7167"/>
+            </a:solidFill>
+          </a:ln>
+        </p:spPr>
+        <p:style>
+          <a:lnRef idx="2">
+            <a:schemeClr val="accent1">
+              <a:shade val="50000"/>
+            </a:schemeClr>
+          </a:lnRef>
+          <a:fillRef idx="1">
+            <a:schemeClr val="accent1"/>
+          </a:fillRef>
+          <a:effectRef idx="0">
+            <a:schemeClr val="accent1"/>
+          </a:effectRef>
+          <a:fontRef idx="minor">
+            <a:schemeClr val="lt1"/>
+          </a:fontRef>
+        </p:style>
+        <p:txBody>
+          <a:bodyPr rtlCol="0" anchor="ctr"/>
+          <a:lstStyle/>
+          <a:p>
+            <a:pPr algn="ctr"/>
+            <a:endParaRPr lang="en-US">
+              <a:solidFill>
+                <a:srgbClr val="008000"/>
+              </a:solidFill>
+            </a:endParaRPr>
+          </a:p>
+        </p:txBody>
+      </p:sp>
     </p:spTree>
     <p:extLst>
       <p:ext uri="{BB962C8B-B14F-4D97-AF65-F5344CB8AC3E}">
@@ -4754,6 +6892,84 @@
   <p:clrMapOvr>
     <a:masterClrMapping/>
   </p:clrMapOvr>
+  <p:timing>
+    <p:tnLst>
+      <p:par>
+        <p:cTn id="1" dur="indefinite" restart="never" nodeType="tmRoot">
+          <p:childTnLst>
+            <p:seq concurrent="1" nextAc="seek">
+              <p:cTn id="2" dur="indefinite" nodeType="mainSeq">
+                <p:childTnLst>
+                  <p:par>
+                    <p:cTn id="3" fill="hold">
+                      <p:stCondLst>
+                        <p:cond delay="indefinite"/>
+                      </p:stCondLst>
+                      <p:childTnLst>
+                        <p:par>
+                          <p:cTn id="4" fill="hold">
+                            <p:stCondLst>
+                              <p:cond delay="0"/>
+                            </p:stCondLst>
+                            <p:childTnLst>
+                              <p:par>
+                                <p:cTn id="5" presetID="1" presetClass="entr" presetSubtype="0" fill="hold" grpId="0" nodeType="clickEffect">
+                                  <p:stCondLst>
+                                    <p:cond delay="0"/>
+                                  </p:stCondLst>
+                                  <p:childTnLst>
+                                    <p:set>
+                                      <p:cBhvr>
+                                        <p:cTn id="6" dur="1" fill="hold">
+                                          <p:stCondLst>
+                                            <p:cond delay="0"/>
+                                          </p:stCondLst>
+                                        </p:cTn>
+                                        <p:tgtEl>
+                                          <p:spTgt spid="2"/>
+                                        </p:tgtEl>
+                                        <p:attrNameLst>
+                                          <p:attrName>style.visibility</p:attrName>
+                                        </p:attrNameLst>
+                                      </p:cBhvr>
+                                      <p:to>
+                                        <p:strVal val="visible"/>
+                                      </p:to>
+                                    </p:set>
+                                  </p:childTnLst>
+                                </p:cTn>
+                              </p:par>
+                            </p:childTnLst>
+                          </p:cTn>
+                        </p:par>
+                      </p:childTnLst>
+                    </p:cTn>
+                  </p:par>
+                </p:childTnLst>
+              </p:cTn>
+              <p:prevCondLst>
+                <p:cond evt="onPrev" delay="0">
+                  <p:tgtEl>
+                    <p:sldTgt/>
+                  </p:tgtEl>
+                </p:cond>
+              </p:prevCondLst>
+              <p:nextCondLst>
+                <p:cond evt="onNext" delay="0">
+                  <p:tgtEl>
+                    <p:sldTgt/>
+                  </p:tgtEl>
+                </p:cond>
+              </p:nextCondLst>
+            </p:seq>
+          </p:childTnLst>
+        </p:cTn>
+      </p:par>
+    </p:tnLst>
+    <p:bldLst>
+      <p:bldP spid="2" grpId="0" animBg="1"/>
+    </p:bldLst>
+  </p:timing>
 </p:sld>
 </file>
 
@@ -4911,6 +7127,151 @@
           </a:extLst>
         </p:spPr>
       </p:pic>
+      <p:sp>
+        <p:nvSpPr>
+          <p:cNvPr id="2" name="Arrow: Right 1">
+            <a:extLst>
+              <a:ext uri="{FF2B5EF4-FFF2-40B4-BE49-F238E27FC236}">
+                <a16:creationId xmlns:a16="http://schemas.microsoft.com/office/drawing/2014/main" id="{E14BFF86-E21C-46A2-A348-FD2D1D888A94}"/>
+              </a:ext>
+            </a:extLst>
+          </p:cNvPr>
+          <p:cNvSpPr/>
+          <p:nvPr/>
+        </p:nvSpPr>
+        <p:spPr>
+          <a:xfrm>
+            <a:off x="5181600" y="1552575"/>
+            <a:ext cx="571500" cy="209550"/>
+          </a:xfrm>
+          <a:prstGeom prst="rightArrow">
+            <a:avLst/>
+          </a:prstGeom>
+          <a:solidFill>
+            <a:srgbClr val="FF0000"/>
+          </a:solidFill>
+          <a:ln>
+            <a:noFill/>
+          </a:ln>
+        </p:spPr>
+        <p:style>
+          <a:lnRef idx="2">
+            <a:schemeClr val="accent1">
+              <a:shade val="50000"/>
+            </a:schemeClr>
+          </a:lnRef>
+          <a:fillRef idx="1">
+            <a:schemeClr val="accent1"/>
+          </a:fillRef>
+          <a:effectRef idx="0">
+            <a:schemeClr val="accent1"/>
+          </a:effectRef>
+          <a:fontRef idx="minor">
+            <a:schemeClr val="lt1"/>
+          </a:fontRef>
+        </p:style>
+        <p:txBody>
+          <a:bodyPr rtlCol="0" anchor="ctr"/>
+          <a:lstStyle/>
+          <a:p>
+            <a:pPr algn="ctr"/>
+            <a:endParaRPr lang="en-US"/>
+          </a:p>
+        </p:txBody>
+      </p:sp>
+      <p:sp>
+        <p:nvSpPr>
+          <p:cNvPr id="5" name="Oval 4">
+            <a:extLst>
+              <a:ext uri="{FF2B5EF4-FFF2-40B4-BE49-F238E27FC236}">
+                <a16:creationId xmlns:a16="http://schemas.microsoft.com/office/drawing/2014/main" id="{8A9019F3-B1DE-4767-BAAD-26CFF770AD2D}"/>
+              </a:ext>
+            </a:extLst>
+          </p:cNvPr>
+          <p:cNvSpPr/>
+          <p:nvPr/>
+        </p:nvSpPr>
+        <p:spPr>
+          <a:xfrm>
+            <a:off x="2609850" y="1552575"/>
+            <a:ext cx="361950" cy="371475"/>
+          </a:xfrm>
+          <a:prstGeom prst="ellipse">
+            <a:avLst/>
+          </a:prstGeom>
+          <a:noFill/>
+          <a:ln w="76200">
+            <a:solidFill>
+              <a:srgbClr val="FF0000"/>
+            </a:solidFill>
+          </a:ln>
+        </p:spPr>
+        <p:style>
+          <a:lnRef idx="2">
+            <a:schemeClr val="accent1">
+              <a:shade val="50000"/>
+            </a:schemeClr>
+          </a:lnRef>
+          <a:fillRef idx="1">
+            <a:schemeClr val="accent1"/>
+          </a:fillRef>
+          <a:effectRef idx="0">
+            <a:schemeClr val="accent1"/>
+          </a:effectRef>
+          <a:fontRef idx="minor">
+            <a:schemeClr val="lt1"/>
+          </a:fontRef>
+        </p:style>
+        <p:txBody>
+          <a:bodyPr rtlCol="0" anchor="ctr"/>
+          <a:lstStyle/>
+          <a:p>
+            <a:pPr algn="ctr"/>
+            <a:endParaRPr lang="en-US"/>
+          </a:p>
+        </p:txBody>
+      </p:sp>
+      <p:cxnSp>
+        <p:nvCxnSpPr>
+          <p:cNvPr id="7" name="Straight Arrow Connector 6">
+            <a:extLst>
+              <a:ext uri="{FF2B5EF4-FFF2-40B4-BE49-F238E27FC236}">
+                <a16:creationId xmlns:a16="http://schemas.microsoft.com/office/drawing/2014/main" id="{EE10CB07-19B8-40B8-B3B1-0A4BE9240F9E}"/>
+              </a:ext>
+            </a:extLst>
+          </p:cNvPr>
+          <p:cNvCxnSpPr>
+            <a:cxnSpLocks/>
+          </p:cNvCxnSpPr>
+          <p:nvPr/>
+        </p:nvCxnSpPr>
+        <p:spPr>
+          <a:xfrm flipH="1">
+            <a:off x="10534650" y="4086225"/>
+            <a:ext cx="638176" cy="314325"/>
+          </a:xfrm>
+          <a:prstGeom prst="straightConnector1">
+            <a:avLst/>
+          </a:prstGeom>
+          <a:ln w="76200">
+            <a:tailEnd type="triangle"/>
+          </a:ln>
+        </p:spPr>
+        <p:style>
+          <a:lnRef idx="1">
+            <a:schemeClr val="accent1"/>
+          </a:lnRef>
+          <a:fillRef idx="0">
+            <a:schemeClr val="accent1"/>
+          </a:fillRef>
+          <a:effectRef idx="0">
+            <a:schemeClr val="accent1"/>
+          </a:effectRef>
+          <a:fontRef idx="minor">
+            <a:schemeClr val="tx1"/>
+          </a:fontRef>
+        </p:style>
+      </p:cxnSp>
     </p:spTree>
     <p:extLst>
       <p:ext uri="{BB962C8B-B14F-4D97-AF65-F5344CB8AC3E}">
@@ -4921,6 +7282,175 @@
   <p:clrMapOvr>
     <a:masterClrMapping/>
   </p:clrMapOvr>
+  <p:timing>
+    <p:tnLst>
+      <p:par>
+        <p:cTn id="1" dur="indefinite" restart="never" nodeType="tmRoot">
+          <p:childTnLst>
+            <p:seq concurrent="1" nextAc="seek">
+              <p:cTn id="2" dur="indefinite" nodeType="mainSeq">
+                <p:childTnLst>
+                  <p:par>
+                    <p:cTn id="3" fill="hold">
+                      <p:stCondLst>
+                        <p:cond delay="indefinite"/>
+                      </p:stCondLst>
+                      <p:childTnLst>
+                        <p:par>
+                          <p:cTn id="4" fill="hold">
+                            <p:stCondLst>
+                              <p:cond delay="0"/>
+                            </p:stCondLst>
+                            <p:childTnLst>
+                              <p:par>
+                                <p:cTn id="5" presetID="1" presetClass="entr" presetSubtype="0" fill="hold" grpId="0" nodeType="clickEffect">
+                                  <p:stCondLst>
+                                    <p:cond delay="0"/>
+                                  </p:stCondLst>
+                                  <p:childTnLst>
+                                    <p:set>
+                                      <p:cBhvr>
+                                        <p:cTn id="6" dur="1" fill="hold">
+                                          <p:stCondLst>
+                                            <p:cond delay="0"/>
+                                          </p:stCondLst>
+                                        </p:cTn>
+                                        <p:tgtEl>
+                                          <p:spTgt spid="2"/>
+                                        </p:tgtEl>
+                                        <p:attrNameLst>
+                                          <p:attrName>style.visibility</p:attrName>
+                                        </p:attrNameLst>
+                                      </p:cBhvr>
+                                      <p:to>
+                                        <p:strVal val="visible"/>
+                                      </p:to>
+                                    </p:set>
+                                  </p:childTnLst>
+                                </p:cTn>
+                              </p:par>
+                            </p:childTnLst>
+                          </p:cTn>
+                        </p:par>
+                      </p:childTnLst>
+                    </p:cTn>
+                  </p:par>
+                  <p:par>
+                    <p:cTn id="7" fill="hold">
+                      <p:stCondLst>
+                        <p:cond delay="indefinite"/>
+                      </p:stCondLst>
+                      <p:childTnLst>
+                        <p:par>
+                          <p:cTn id="8" fill="hold">
+                            <p:stCondLst>
+                              <p:cond delay="0"/>
+                            </p:stCondLst>
+                            <p:childTnLst>
+                              <p:par>
+                                <p:cTn id="9" presetID="1" presetClass="entr" presetSubtype="0" fill="hold" grpId="0" nodeType="clickEffect">
+                                  <p:stCondLst>
+                                    <p:cond delay="0"/>
+                                  </p:stCondLst>
+                                  <p:childTnLst>
+                                    <p:set>
+                                      <p:cBhvr>
+                                        <p:cTn id="10" dur="1" fill="hold">
+                                          <p:stCondLst>
+                                            <p:cond delay="0"/>
+                                          </p:stCondLst>
+                                        </p:cTn>
+                                        <p:tgtEl>
+                                          <p:spTgt spid="5"/>
+                                        </p:tgtEl>
+                                        <p:attrNameLst>
+                                          <p:attrName>style.visibility</p:attrName>
+                                        </p:attrNameLst>
+                                      </p:cBhvr>
+                                      <p:to>
+                                        <p:strVal val="visible"/>
+                                      </p:to>
+                                    </p:set>
+                                  </p:childTnLst>
+                                </p:cTn>
+                              </p:par>
+                            </p:childTnLst>
+                          </p:cTn>
+                        </p:par>
+                      </p:childTnLst>
+                    </p:cTn>
+                  </p:par>
+                  <p:par>
+                    <p:cTn id="11" fill="hold">
+                      <p:stCondLst>
+                        <p:cond delay="indefinite"/>
+                      </p:stCondLst>
+                      <p:childTnLst>
+                        <p:par>
+                          <p:cTn id="12" fill="hold">
+                            <p:stCondLst>
+                              <p:cond delay="0"/>
+                            </p:stCondLst>
+                            <p:childTnLst>
+                              <p:par>
+                                <p:cTn id="13" presetID="1" presetClass="entr" presetSubtype="0" fill="hold" nodeType="clickEffect">
+                                  <p:stCondLst>
+                                    <p:cond delay="0"/>
+                                  </p:stCondLst>
+                                  <p:childTnLst>
+                                    <p:set>
+                                      <p:cBhvr>
+                                        <p:cTn id="14" dur="1" fill="hold">
+                                          <p:stCondLst>
+                                            <p:cond delay="0"/>
+                                          </p:stCondLst>
+                                        </p:cTn>
+                                        <p:tgtEl>
+                                          <p:spTgt spid="7"/>
+                                        </p:tgtEl>
+                                        <p:attrNameLst>
+                                          <p:attrName>style.visibility</p:attrName>
+                                        </p:attrNameLst>
+                                      </p:cBhvr>
+                                      <p:to>
+                                        <p:strVal val="visible"/>
+                                      </p:to>
+                                    </p:set>
+                                  </p:childTnLst>
+                                </p:cTn>
+                              </p:par>
+                            </p:childTnLst>
+                          </p:cTn>
+                        </p:par>
+                      </p:childTnLst>
+                    </p:cTn>
+                  </p:par>
+                </p:childTnLst>
+              </p:cTn>
+              <p:prevCondLst>
+                <p:cond evt="onPrev" delay="0">
+                  <p:tgtEl>
+                    <p:sldTgt/>
+                  </p:tgtEl>
+                </p:cond>
+              </p:prevCondLst>
+              <p:nextCondLst>
+                <p:cond evt="onNext" delay="0">
+                  <p:tgtEl>
+                    <p:sldTgt/>
+                  </p:tgtEl>
+                </p:cond>
+              </p:nextCondLst>
+            </p:seq>
+          </p:childTnLst>
+        </p:cTn>
+      </p:par>
+    </p:tnLst>
+    <p:bldLst>
+      <p:bldP spid="2" grpId="0" animBg="1"/>
+      <p:bldP spid="5" grpId="0" animBg="1"/>
+    </p:bldLst>
+  </p:timing>
 </p:sld>
 </file>
 
@@ -5268,8 +7798,8 @@
         </p:nvSpPr>
         <p:spPr>
           <a:xfrm>
-            <a:off x="3248105" y="414668"/>
-            <a:ext cx="5293116" cy="646331"/>
+            <a:off x="3733140" y="199950"/>
+            <a:ext cx="4725717" cy="584775"/>
           </a:xfrm>
           <a:prstGeom prst="rect">
             <a:avLst/>
@@ -5283,7 +7813,7 @@
           <a:lstStyle/>
           <a:p>
             <a:r>
-              <a:rPr lang="en-US" sz="3600" dirty="0">
+              <a:rPr lang="en-US" sz="3200" dirty="0">
                 <a:latin typeface="Aileron Black" panose="00000A00000000000000" pitchFamily="50" charset="0"/>
               </a:rPr>
               <a:t>Interactive Dashboard</a:t>
@@ -5326,6 +7856,44 @@
           </a:ln>
         </p:spPr>
       </p:pic>
+      <p:sp>
+        <p:nvSpPr>
+          <p:cNvPr id="2" name="TextBox 1">
+            <a:extLst>
+              <a:ext uri="{FF2B5EF4-FFF2-40B4-BE49-F238E27FC236}">
+                <a16:creationId xmlns:a16="http://schemas.microsoft.com/office/drawing/2014/main" id="{2D00C1EA-ECAD-49DB-8EA9-84054B28B1FA}"/>
+              </a:ext>
+            </a:extLst>
+          </p:cNvPr>
+          <p:cNvSpPr txBox="1"/>
+          <p:nvPr/>
+        </p:nvSpPr>
+        <p:spPr>
+          <a:xfrm>
+            <a:off x="4968894" y="784725"/>
+            <a:ext cx="2254207" cy="338554"/>
+          </a:xfrm>
+          <a:prstGeom prst="rect">
+            <a:avLst/>
+          </a:prstGeom>
+          <a:noFill/>
+        </p:spPr>
+        <p:txBody>
+          <a:bodyPr wrap="none" rtlCol="0">
+            <a:spAutoFit/>
+          </a:bodyPr>
+          <a:lstStyle/>
+          <a:p>
+            <a:r>
+              <a:rPr lang="en-US" sz="1600" dirty="0">
+                <a:hlinkClick r:id="rId4" action="ppaction://hlinkfile"/>
+              </a:rPr>
+              <a:t>Power BI Dashboard Link</a:t>
+            </a:r>
+            <a:endParaRPr lang="en-US" sz="1600" dirty="0"/>
+          </a:p>
+        </p:txBody>
+      </p:sp>
     </p:spTree>
     <p:extLst>
       <p:ext uri="{BB962C8B-B14F-4D97-AF65-F5344CB8AC3E}">
@@ -5336,6 +7904,84 @@
   <p:clrMapOvr>
     <a:masterClrMapping/>
   </p:clrMapOvr>
+  <p:timing>
+    <p:tnLst>
+      <p:par>
+        <p:cTn id="1" dur="indefinite" restart="never" nodeType="tmRoot">
+          <p:childTnLst>
+            <p:seq concurrent="1" nextAc="seek">
+              <p:cTn id="2" dur="indefinite" nodeType="mainSeq">
+                <p:childTnLst>
+                  <p:par>
+                    <p:cTn id="3" fill="hold">
+                      <p:stCondLst>
+                        <p:cond delay="indefinite"/>
+                      </p:stCondLst>
+                      <p:childTnLst>
+                        <p:par>
+                          <p:cTn id="4" fill="hold">
+                            <p:stCondLst>
+                              <p:cond delay="0"/>
+                            </p:stCondLst>
+                            <p:childTnLst>
+                              <p:par>
+                                <p:cTn id="5" presetID="1" presetClass="entr" presetSubtype="0" fill="hold" grpId="0" nodeType="clickEffect">
+                                  <p:stCondLst>
+                                    <p:cond delay="0"/>
+                                  </p:stCondLst>
+                                  <p:childTnLst>
+                                    <p:set>
+                                      <p:cBhvr>
+                                        <p:cTn id="6" dur="1" fill="hold">
+                                          <p:stCondLst>
+                                            <p:cond delay="0"/>
+                                          </p:stCondLst>
+                                        </p:cTn>
+                                        <p:tgtEl>
+                                          <p:spTgt spid="2"/>
+                                        </p:tgtEl>
+                                        <p:attrNameLst>
+                                          <p:attrName>style.visibility</p:attrName>
+                                        </p:attrNameLst>
+                                      </p:cBhvr>
+                                      <p:to>
+                                        <p:strVal val="visible"/>
+                                      </p:to>
+                                    </p:set>
+                                  </p:childTnLst>
+                                </p:cTn>
+                              </p:par>
+                            </p:childTnLst>
+                          </p:cTn>
+                        </p:par>
+                      </p:childTnLst>
+                    </p:cTn>
+                  </p:par>
+                </p:childTnLst>
+              </p:cTn>
+              <p:prevCondLst>
+                <p:cond evt="onPrev" delay="0">
+                  <p:tgtEl>
+                    <p:sldTgt/>
+                  </p:tgtEl>
+                </p:cond>
+              </p:prevCondLst>
+              <p:nextCondLst>
+                <p:cond evt="onNext" delay="0">
+                  <p:tgtEl>
+                    <p:sldTgt/>
+                  </p:tgtEl>
+                </p:cond>
+              </p:nextCondLst>
+            </p:seq>
+          </p:childTnLst>
+        </p:cTn>
+      </p:par>
+    </p:tnLst>
+    <p:bldLst>
+      <p:bldP spid="2" grpId="0"/>
+    </p:bldLst>
+  </p:timing>
 </p:sld>
 </file>
 

</xml_diff>

<commit_message>
feat: add Tableau visualization
</commit_message>
<xml_diff>
--- a/Nutrien.pptx
+++ b/Nutrien.pptx
@@ -270,7 +270,7 @@
           <a:p>
             <a:fld id="{7984942A-A6E4-45C9-8316-3A8E0C568DE1}" type="datetimeFigureOut">
               <a:rPr lang="en-US" smtClean="0"/>
-              <a:t>12/15/2024</a:t>
+              <a:t>1/2/25</a:t>
             </a:fld>
             <a:endParaRPr lang="en-US"/>
           </a:p>
@@ -468,7 +468,7 @@
           <a:p>
             <a:fld id="{7984942A-A6E4-45C9-8316-3A8E0C568DE1}" type="datetimeFigureOut">
               <a:rPr lang="en-US" smtClean="0"/>
-              <a:t>12/15/2024</a:t>
+              <a:t>1/2/25</a:t>
             </a:fld>
             <a:endParaRPr lang="en-US"/>
           </a:p>
@@ -676,7 +676,7 @@
           <a:p>
             <a:fld id="{7984942A-A6E4-45C9-8316-3A8E0C568DE1}" type="datetimeFigureOut">
               <a:rPr lang="en-US" smtClean="0"/>
-              <a:t>12/15/2024</a:t>
+              <a:t>1/2/25</a:t>
             </a:fld>
             <a:endParaRPr lang="en-US"/>
           </a:p>
@@ -874,7 +874,7 @@
           <a:p>
             <a:fld id="{7984942A-A6E4-45C9-8316-3A8E0C568DE1}" type="datetimeFigureOut">
               <a:rPr lang="en-US" smtClean="0"/>
-              <a:t>12/15/2024</a:t>
+              <a:t>1/2/25</a:t>
             </a:fld>
             <a:endParaRPr lang="en-US"/>
           </a:p>
@@ -1149,7 +1149,7 @@
           <a:p>
             <a:fld id="{7984942A-A6E4-45C9-8316-3A8E0C568DE1}" type="datetimeFigureOut">
               <a:rPr lang="en-US" smtClean="0"/>
-              <a:t>12/15/2024</a:t>
+              <a:t>1/2/25</a:t>
             </a:fld>
             <a:endParaRPr lang="en-US"/>
           </a:p>
@@ -1414,7 +1414,7 @@
           <a:p>
             <a:fld id="{7984942A-A6E4-45C9-8316-3A8E0C568DE1}" type="datetimeFigureOut">
               <a:rPr lang="en-US" smtClean="0"/>
-              <a:t>12/15/2024</a:t>
+              <a:t>1/2/25</a:t>
             </a:fld>
             <a:endParaRPr lang="en-US"/>
           </a:p>
@@ -1826,7 +1826,7 @@
           <a:p>
             <a:fld id="{7984942A-A6E4-45C9-8316-3A8E0C568DE1}" type="datetimeFigureOut">
               <a:rPr lang="en-US" smtClean="0"/>
-              <a:t>12/15/2024</a:t>
+              <a:t>1/2/25</a:t>
             </a:fld>
             <a:endParaRPr lang="en-US"/>
           </a:p>
@@ -1967,7 +1967,7 @@
           <a:p>
             <a:fld id="{7984942A-A6E4-45C9-8316-3A8E0C568DE1}" type="datetimeFigureOut">
               <a:rPr lang="en-US" smtClean="0"/>
-              <a:t>12/15/2024</a:t>
+              <a:t>1/2/25</a:t>
             </a:fld>
             <a:endParaRPr lang="en-US"/>
           </a:p>
@@ -2080,7 +2080,7 @@
           <a:p>
             <a:fld id="{7984942A-A6E4-45C9-8316-3A8E0C568DE1}" type="datetimeFigureOut">
               <a:rPr lang="en-US" smtClean="0"/>
-              <a:t>12/15/2024</a:t>
+              <a:t>1/2/25</a:t>
             </a:fld>
             <a:endParaRPr lang="en-US"/>
           </a:p>
@@ -2391,7 +2391,7 @@
           <a:p>
             <a:fld id="{7984942A-A6E4-45C9-8316-3A8E0C568DE1}" type="datetimeFigureOut">
               <a:rPr lang="en-US" smtClean="0"/>
-              <a:t>12/15/2024</a:t>
+              <a:t>1/2/25</a:t>
             </a:fld>
             <a:endParaRPr lang="en-US"/>
           </a:p>
@@ -2679,7 +2679,7 @@
           <a:p>
             <a:fld id="{7984942A-A6E4-45C9-8316-3A8E0C568DE1}" type="datetimeFigureOut">
               <a:rPr lang="en-US" smtClean="0"/>
-              <a:t>12/15/2024</a:t>
+              <a:t>1/2/25</a:t>
             </a:fld>
             <a:endParaRPr lang="en-US"/>
           </a:p>
@@ -2920,7 +2920,7 @@
           <a:p>
             <a:fld id="{7984942A-A6E4-45C9-8316-3A8E0C568DE1}" type="datetimeFigureOut">
               <a:rPr lang="en-US" smtClean="0"/>
-              <a:t>12/15/2024</a:t>
+              <a:t>1/2/25</a:t>
             </a:fld>
             <a:endParaRPr lang="en-US"/>
           </a:p>
@@ -7561,8 +7561,8 @@
           </a:extLst>
         </p:spPr>
       </p:pic>
-      <mc:AlternateContent xmlns:mc="http://schemas.openxmlformats.org/markup-compatibility/2006">
-        <mc:Choice xmlns:we="http://schemas.microsoft.com/office/webextensions/webextension/2010/11" xmlns:pca="http://schemas.microsoft.com/office/powerpoint/2013/contentapp" Requires="we pca">
+      <mc:AlternateContent xmlns:mc="http://schemas.openxmlformats.org/markup-compatibility/2006" xmlns:we="http://schemas.microsoft.com/office/webextensions/webextension/2010/11" xmlns:pca="http://schemas.microsoft.com/office/powerpoint/2013/contentapp">
+        <mc:Choice Requires="we pca">
           <p:graphicFrame>
             <p:nvGraphicFramePr>
               <p:cNvPr id="6" name="Add-in 5" title="Web Viewer">
@@ -7594,7 +7594,7 @@
             </a:graphic>
           </p:graphicFrame>
         </mc:Choice>
-        <mc:Fallback>
+        <mc:Fallback xmlns="">
           <p:pic>
             <p:nvPicPr>
               <p:cNvPr id="6" name="Add-in 5" title="Web Viewer">
@@ -7870,7 +7870,7 @@
         </p:nvSpPr>
         <p:spPr>
           <a:xfrm>
-            <a:off x="4968894" y="784725"/>
+            <a:off x="3186242" y="784725"/>
             <a:ext cx="2254207" cy="338554"/>
           </a:xfrm>
           <a:prstGeom prst="rect">
@@ -7889,6 +7889,44 @@
                 <a:hlinkClick r:id="rId4" action="ppaction://hlinkfile"/>
               </a:rPr>
               <a:t>Power BI Dashboard Link</a:t>
+            </a:r>
+            <a:endParaRPr lang="en-US" sz="1600" dirty="0"/>
+          </a:p>
+        </p:txBody>
+      </p:sp>
+      <p:sp>
+        <p:nvSpPr>
+          <p:cNvPr id="3" name="TextBox 2">
+            <a:extLst>
+              <a:ext uri="{FF2B5EF4-FFF2-40B4-BE49-F238E27FC236}">
+                <a16:creationId xmlns:a16="http://schemas.microsoft.com/office/drawing/2014/main" id="{B2E8C40D-C691-5429-0980-FEA8FB7A6A6E}"/>
+              </a:ext>
+            </a:extLst>
+          </p:cNvPr>
+          <p:cNvSpPr txBox="1"/>
+          <p:nvPr/>
+        </p:nvSpPr>
+        <p:spPr>
+          <a:xfrm>
+            <a:off x="5871281" y="784725"/>
+            <a:ext cx="2156744" cy="338554"/>
+          </a:xfrm>
+          <a:prstGeom prst="rect">
+            <a:avLst/>
+          </a:prstGeom>
+          <a:noFill/>
+        </p:spPr>
+        <p:txBody>
+          <a:bodyPr wrap="none" rtlCol="0">
+            <a:spAutoFit/>
+          </a:bodyPr>
+          <a:lstStyle/>
+          <a:p>
+            <a:r>
+              <a:rPr lang="en-US" sz="1600" dirty="0">
+                <a:hlinkClick r:id="rId5"/>
+              </a:rPr>
+              <a:t>Tableau Dashboard Link</a:t>
             </a:r>
             <a:endParaRPr lang="en-US" sz="1600" dirty="0"/>
           </a:p>
@@ -7957,6 +7995,51 @@
                       </p:childTnLst>
                     </p:cTn>
                   </p:par>
+                  <p:par>
+                    <p:cTn id="7" fill="hold">
+                      <p:stCondLst>
+                        <p:cond delay="indefinite"/>
+                      </p:stCondLst>
+                      <p:childTnLst>
+                        <p:par>
+                          <p:cTn id="8" fill="hold">
+                            <p:stCondLst>
+                              <p:cond delay="0"/>
+                            </p:stCondLst>
+                            <p:childTnLst>
+                              <p:par>
+                                <p:cTn id="9" presetID="1" presetClass="entr" presetSubtype="0" fill="hold" grpId="0" nodeType="clickEffect">
+                                  <p:stCondLst>
+                                    <p:cond delay="0"/>
+                                  </p:stCondLst>
+                                  <p:childTnLst>
+                                    <p:set>
+                                      <p:cBhvr>
+                                        <p:cTn id="10" dur="1" fill="hold">
+                                          <p:stCondLst>
+                                            <p:cond delay="0"/>
+                                          </p:stCondLst>
+                                        </p:cTn>
+                                        <p:tgtEl>
+                                          <p:spTgt spid="3"/>
+                                        </p:tgtEl>
+                                        <p:attrNameLst>
+                                          <p:attrName>style.visibility</p:attrName>
+                                        </p:attrNameLst>
+                                      </p:cBhvr>
+                                      <p:to>
+                                        <p:strVal val="visible"/>
+                                      </p:to>
+                                    </p:set>
+                                  </p:childTnLst>
+                                </p:cTn>
+                              </p:par>
+                            </p:childTnLst>
+                          </p:cTn>
+                        </p:par>
+                      </p:childTnLst>
+                    </p:cTn>
+                  </p:par>
                 </p:childTnLst>
               </p:cTn>
               <p:prevCondLst>
@@ -7980,6 +8063,7 @@
     </p:tnLst>
     <p:bldLst>
       <p:bldP spid="2" grpId="0"/>
+      <p:bldP spid="3" grpId="0"/>
     </p:bldLst>
   </p:timing>
 </p:sld>

</xml_diff>